<commit_message>
I changed all of the graphs to bar graphs and completed the first draft of the Board Snapshot
</commit_message>
<xml_diff>
--- a/writeup/Board Snapshot.pptx
+++ b/writeup/Board Snapshot.pptx
@@ -1,6 +1,6 @@
 
 <file path=ppt/presentation.xml><?xml version="1.0" encoding="utf-8"?>
-<p:presentation xmlns:a="http://schemas.openxmlformats.org/drawingml/2006/main" xmlns:r="http://schemas.openxmlformats.org/officeDocument/2006/relationships" xmlns:p="http://schemas.openxmlformats.org/presentationml/2006/main" showSpecialPlsOnTitleSld="0" removePersonalInfoOnSave="1" compatMode="1" strictFirstAndLastChars="0" saveSubsetFonts="1">
+<p:presentation xmlns:a="http://schemas.openxmlformats.org/drawingml/2006/main" xmlns:r="http://schemas.openxmlformats.org/officeDocument/2006/relationships" xmlns:p="http://schemas.openxmlformats.org/presentationml/2006/main" showSpecialPlsOnTitleSld="0" removePersonalInfoOnSave="1" strictFirstAndLastChars="0" saveSubsetFonts="1">
   <p:sldMasterIdLst>
     <p:sldMasterId id="2147483654" r:id="rId1"/>
   </p:sldMasterIdLst>
@@ -5880,7 +5880,7 @@
           <a:lstStyle/>
           <a:p>
             <a:pPr algn="ctr" defTabSz="4806950"/>
-            <a:endParaRPr lang="en-US" sz="1800"/>
+            <a:endParaRPr lang="en-US" sz="1800" dirty="0"/>
           </a:p>
         </p:txBody>
       </p:sp>
@@ -6306,7 +6306,7 @@
         </p:nvSpPr>
         <p:spPr bwMode="auto">
           <a:xfrm>
-            <a:off x="2447925" y="15744078"/>
+            <a:off x="2447925" y="14924698"/>
             <a:ext cx="10164763" cy="795337"/>
           </a:xfrm>
           <a:prstGeom prst="rect">
@@ -6475,8 +6475,178 @@
         </p:nvSpPr>
         <p:spPr bwMode="auto">
           <a:xfrm>
-            <a:off x="3460750" y="16972612"/>
-            <a:ext cx="8108950" cy="954107"/>
+            <a:off x="3092026" y="15661604"/>
+            <a:ext cx="8625169" cy="6863416"/>
+          </a:xfrm>
+          <a:prstGeom prst="rect">
+            <a:avLst/>
+          </a:prstGeom>
+          <a:noFill/>
+          <a:ln>
+            <a:noFill/>
+          </a:ln>
+          <a:extLst>
+            <a:ext uri="{909E8E84-426E-40dd-AFC4-6F175D3DCCD1}">
+              <a14:hiddenFill xmlns:a14="http://schemas.microsoft.com/office/drawing/2010/main">
+                <a:solidFill>
+                  <a:srgbClr val="FFFFFF"/>
+                </a:solidFill>
+              </a14:hiddenFill>
+            </a:ext>
+            <a:ext uri="{91240B29-F687-4f45-9708-019B960494DF}">
+              <a14:hiddenLine xmlns:a14="http://schemas.microsoft.com/office/drawing/2010/main" w="9525">
+                <a:solidFill>
+                  <a:srgbClr val="000000"/>
+                </a:solidFill>
+                <a:miter lim="800000"/>
+                <a:headEnd/>
+                <a:tailEnd/>
+              </a14:hiddenLine>
+            </a:ext>
+          </a:extLst>
+        </p:spPr>
+        <p:txBody>
+          <a:bodyPr wrap="square">
+            <a:spAutoFit/>
+          </a:bodyPr>
+          <a:lstStyle>
+            <a:lvl1pPr eaLnBrk="0" hangingPunct="0">
+              <a:defRPr sz="4400">
+                <a:solidFill>
+                  <a:schemeClr val="tx1"/>
+                </a:solidFill>
+                <a:latin typeface="Arial" charset="0"/>
+                <a:ea typeface="ＭＳ Ｐゴシック" charset="0"/>
+                <a:cs typeface="Arial" charset="0"/>
+              </a:defRPr>
+            </a:lvl1pPr>
+            <a:lvl2pPr marL="742950" indent="-285750" eaLnBrk="0" hangingPunct="0">
+              <a:defRPr sz="4400">
+                <a:solidFill>
+                  <a:schemeClr val="tx1"/>
+                </a:solidFill>
+                <a:latin typeface="Arial" charset="0"/>
+                <a:ea typeface="Arial" charset="0"/>
+                <a:cs typeface="Arial" charset="0"/>
+              </a:defRPr>
+            </a:lvl2pPr>
+            <a:lvl3pPr marL="1143000" indent="-228600" eaLnBrk="0" hangingPunct="0">
+              <a:defRPr sz="4400">
+                <a:solidFill>
+                  <a:schemeClr val="tx1"/>
+                </a:solidFill>
+                <a:latin typeface="Arial" charset="0"/>
+                <a:ea typeface="Arial" charset="0"/>
+                <a:cs typeface="Arial" charset="0"/>
+              </a:defRPr>
+            </a:lvl3pPr>
+            <a:lvl4pPr marL="1600200" indent="-228600" eaLnBrk="0" hangingPunct="0">
+              <a:defRPr sz="4400">
+                <a:solidFill>
+                  <a:schemeClr val="tx1"/>
+                </a:solidFill>
+                <a:latin typeface="Arial" charset="0"/>
+                <a:ea typeface="Arial" charset="0"/>
+                <a:cs typeface="Arial" charset="0"/>
+              </a:defRPr>
+            </a:lvl4pPr>
+            <a:lvl5pPr marL="2057400" indent="-228600" eaLnBrk="0" hangingPunct="0">
+              <a:defRPr sz="4400">
+                <a:solidFill>
+                  <a:schemeClr val="tx1"/>
+                </a:solidFill>
+                <a:latin typeface="Arial" charset="0"/>
+                <a:ea typeface="Arial" charset="0"/>
+                <a:cs typeface="Arial" charset="0"/>
+              </a:defRPr>
+            </a:lvl5pPr>
+            <a:lvl6pPr marL="2514600" indent="-228600" eaLnBrk="0" fontAlgn="base" hangingPunct="0">
+              <a:spcBef>
+                <a:spcPct val="0"/>
+              </a:spcBef>
+              <a:spcAft>
+                <a:spcPct val="0"/>
+              </a:spcAft>
+              <a:defRPr sz="4400">
+                <a:solidFill>
+                  <a:schemeClr val="tx1"/>
+                </a:solidFill>
+                <a:latin typeface="Arial" charset="0"/>
+                <a:ea typeface="Arial" charset="0"/>
+                <a:cs typeface="Arial" charset="0"/>
+              </a:defRPr>
+            </a:lvl6pPr>
+            <a:lvl7pPr marL="2971800" indent="-228600" eaLnBrk="0" fontAlgn="base" hangingPunct="0">
+              <a:spcBef>
+                <a:spcPct val="0"/>
+              </a:spcBef>
+              <a:spcAft>
+                <a:spcPct val="0"/>
+              </a:spcAft>
+              <a:defRPr sz="4400">
+                <a:solidFill>
+                  <a:schemeClr val="tx1"/>
+                </a:solidFill>
+                <a:latin typeface="Arial" charset="0"/>
+                <a:ea typeface="Arial" charset="0"/>
+                <a:cs typeface="Arial" charset="0"/>
+              </a:defRPr>
+            </a:lvl7pPr>
+            <a:lvl8pPr marL="3429000" indent="-228600" eaLnBrk="0" fontAlgn="base" hangingPunct="0">
+              <a:spcBef>
+                <a:spcPct val="0"/>
+              </a:spcBef>
+              <a:spcAft>
+                <a:spcPct val="0"/>
+              </a:spcAft>
+              <a:defRPr sz="4400">
+                <a:solidFill>
+                  <a:schemeClr val="tx1"/>
+                </a:solidFill>
+                <a:latin typeface="Arial" charset="0"/>
+                <a:ea typeface="Arial" charset="0"/>
+                <a:cs typeface="Arial" charset="0"/>
+              </a:defRPr>
+            </a:lvl8pPr>
+            <a:lvl9pPr marL="3886200" indent="-228600" eaLnBrk="0" fontAlgn="base" hangingPunct="0">
+              <a:spcBef>
+                <a:spcPct val="0"/>
+              </a:spcBef>
+              <a:spcAft>
+                <a:spcPct val="0"/>
+              </a:spcAft>
+              <a:defRPr sz="4400">
+                <a:solidFill>
+                  <a:schemeClr val="tx1"/>
+                </a:solidFill>
+                <a:latin typeface="Arial" charset="0"/>
+                <a:ea typeface="Arial" charset="0"/>
+                <a:cs typeface="Arial" charset="0"/>
+              </a:defRPr>
+            </a:lvl9pPr>
+          </a:lstStyle>
+          <a:p>
+            <a:pPr eaLnBrk="1" hangingPunct="1"/>
+            <a:r>
+              <a:rPr lang="en-US" dirty="0" smtClean="0"/>
+              <a:t>With the beginnings of smart appliances around the home, technology such as Bluetooth Low Energy is becoming more important than ever, but little is known about its range. This experiment was designed to determine the practical range of Bluetooth Low Energy both inside and outside.</a:t>
+            </a:r>
+            <a:endParaRPr lang="en-US" dirty="0"/>
+          </a:p>
+        </p:txBody>
+      </p:sp>
+      <p:sp>
+        <p:nvSpPr>
+          <p:cNvPr id="3086" name="Text Box 149"/>
+          <p:cNvSpPr txBox="1">
+            <a:spLocks noChangeArrowheads="1"/>
+          </p:cNvSpPr>
+          <p:nvPr/>
+        </p:nvSpPr>
+        <p:spPr bwMode="auto">
+          <a:xfrm>
+            <a:off x="2474913" y="22981090"/>
+            <a:ext cx="10085387" cy="769937"/>
           </a:xfrm>
           <a:prstGeom prst="rect">
             <a:avLst/>
@@ -6626,182 +6796,9 @@
             </a:lvl9pPr>
           </a:lstStyle>
           <a:p>
-            <a:pPr eaLnBrk="1" hangingPunct="1"/>
-            <a:r>
-              <a:rPr lang="en-US" sz="2800" dirty="0"/>
-              <a:t/>
-            </a:r>
-            <a:br>
-              <a:rPr lang="en-US" sz="2800" dirty="0"/>
-            </a:br>
-            <a:endParaRPr lang="en-US" sz="2800" dirty="0"/>
-          </a:p>
-        </p:txBody>
-      </p:sp>
-      <p:sp>
-        <p:nvSpPr>
-          <p:cNvPr id="3086" name="Text Box 149"/>
-          <p:cNvSpPr txBox="1">
-            <a:spLocks noChangeArrowheads="1"/>
-          </p:cNvSpPr>
-          <p:nvPr/>
-        </p:nvSpPr>
-        <p:spPr bwMode="auto">
-          <a:xfrm>
-            <a:off x="2474913" y="23677563"/>
-            <a:ext cx="10085387" cy="769937"/>
-          </a:xfrm>
-          <a:prstGeom prst="rect">
-            <a:avLst/>
-          </a:prstGeom>
-          <a:noFill/>
-          <a:ln>
-            <a:noFill/>
-          </a:ln>
-          <a:extLst>
-            <a:ext uri="{909E8E84-426E-40dd-AFC4-6F175D3DCCD1}">
-              <a14:hiddenFill xmlns:a14="http://schemas.microsoft.com/office/drawing/2010/main">
-                <a:solidFill>
-                  <a:srgbClr val="FFFFFF"/>
-                </a:solidFill>
-              </a14:hiddenFill>
-            </a:ext>
-            <a:ext uri="{91240B29-F687-4f45-9708-019B960494DF}">
-              <a14:hiddenLine xmlns:a14="http://schemas.microsoft.com/office/drawing/2010/main" w="9525">
-                <a:solidFill>
-                  <a:srgbClr val="000000"/>
-                </a:solidFill>
-                <a:miter lim="800000"/>
-                <a:headEnd/>
-                <a:tailEnd/>
-              </a14:hiddenLine>
-            </a:ext>
-          </a:extLst>
-        </p:spPr>
-        <p:txBody>
-          <a:bodyPr>
-            <a:spAutoFit/>
-          </a:bodyPr>
-          <a:lstStyle>
-            <a:lvl1pPr eaLnBrk="0" hangingPunct="0">
-              <a:defRPr sz="4400">
-                <a:solidFill>
-                  <a:schemeClr val="tx1"/>
-                </a:solidFill>
-                <a:latin typeface="Arial" charset="0"/>
-                <a:ea typeface="ＭＳ Ｐゴシック" charset="0"/>
-                <a:cs typeface="Arial" charset="0"/>
-              </a:defRPr>
-            </a:lvl1pPr>
-            <a:lvl2pPr marL="742950" indent="-285750" eaLnBrk="0" hangingPunct="0">
-              <a:defRPr sz="4400">
-                <a:solidFill>
-                  <a:schemeClr val="tx1"/>
-                </a:solidFill>
-                <a:latin typeface="Arial" charset="0"/>
-                <a:ea typeface="Arial" charset="0"/>
-                <a:cs typeface="Arial" charset="0"/>
-              </a:defRPr>
-            </a:lvl2pPr>
-            <a:lvl3pPr marL="1143000" indent="-228600" eaLnBrk="0" hangingPunct="0">
-              <a:defRPr sz="4400">
-                <a:solidFill>
-                  <a:schemeClr val="tx1"/>
-                </a:solidFill>
-                <a:latin typeface="Arial" charset="0"/>
-                <a:ea typeface="Arial" charset="0"/>
-                <a:cs typeface="Arial" charset="0"/>
-              </a:defRPr>
-            </a:lvl3pPr>
-            <a:lvl4pPr marL="1600200" indent="-228600" eaLnBrk="0" hangingPunct="0">
-              <a:defRPr sz="4400">
-                <a:solidFill>
-                  <a:schemeClr val="tx1"/>
-                </a:solidFill>
-                <a:latin typeface="Arial" charset="0"/>
-                <a:ea typeface="Arial" charset="0"/>
-                <a:cs typeface="Arial" charset="0"/>
-              </a:defRPr>
-            </a:lvl4pPr>
-            <a:lvl5pPr marL="2057400" indent="-228600" eaLnBrk="0" hangingPunct="0">
-              <a:defRPr sz="4400">
-                <a:solidFill>
-                  <a:schemeClr val="tx1"/>
-                </a:solidFill>
-                <a:latin typeface="Arial" charset="0"/>
-                <a:ea typeface="Arial" charset="0"/>
-                <a:cs typeface="Arial" charset="0"/>
-              </a:defRPr>
-            </a:lvl5pPr>
-            <a:lvl6pPr marL="2514600" indent="-228600" eaLnBrk="0" fontAlgn="base" hangingPunct="0">
-              <a:spcBef>
-                <a:spcPct val="0"/>
-              </a:spcBef>
-              <a:spcAft>
-                <a:spcPct val="0"/>
-              </a:spcAft>
-              <a:defRPr sz="4400">
-                <a:solidFill>
-                  <a:schemeClr val="tx1"/>
-                </a:solidFill>
-                <a:latin typeface="Arial" charset="0"/>
-                <a:ea typeface="Arial" charset="0"/>
-                <a:cs typeface="Arial" charset="0"/>
-              </a:defRPr>
-            </a:lvl6pPr>
-            <a:lvl7pPr marL="2971800" indent="-228600" eaLnBrk="0" fontAlgn="base" hangingPunct="0">
-              <a:spcBef>
-                <a:spcPct val="0"/>
-              </a:spcBef>
-              <a:spcAft>
-                <a:spcPct val="0"/>
-              </a:spcAft>
-              <a:defRPr sz="4400">
-                <a:solidFill>
-                  <a:schemeClr val="tx1"/>
-                </a:solidFill>
-                <a:latin typeface="Arial" charset="0"/>
-                <a:ea typeface="Arial" charset="0"/>
-                <a:cs typeface="Arial" charset="0"/>
-              </a:defRPr>
-            </a:lvl7pPr>
-            <a:lvl8pPr marL="3429000" indent="-228600" eaLnBrk="0" fontAlgn="base" hangingPunct="0">
-              <a:spcBef>
-                <a:spcPct val="0"/>
-              </a:spcBef>
-              <a:spcAft>
-                <a:spcPct val="0"/>
-              </a:spcAft>
-              <a:defRPr sz="4400">
-                <a:solidFill>
-                  <a:schemeClr val="tx1"/>
-                </a:solidFill>
-                <a:latin typeface="Arial" charset="0"/>
-                <a:ea typeface="Arial" charset="0"/>
-                <a:cs typeface="Arial" charset="0"/>
-              </a:defRPr>
-            </a:lvl8pPr>
-            <a:lvl9pPr marL="3886200" indent="-228600" eaLnBrk="0" fontAlgn="base" hangingPunct="0">
-              <a:spcBef>
-                <a:spcPct val="0"/>
-              </a:spcBef>
-              <a:spcAft>
-                <a:spcPct val="0"/>
-              </a:spcAft>
-              <a:defRPr sz="4400">
-                <a:solidFill>
-                  <a:schemeClr val="tx1"/>
-                </a:solidFill>
-                <a:latin typeface="Arial" charset="0"/>
-                <a:ea typeface="Arial" charset="0"/>
-                <a:cs typeface="Arial" charset="0"/>
-              </a:defRPr>
-            </a:lvl9pPr>
-          </a:lstStyle>
-          <a:p>
             <a:pPr algn="ctr" eaLnBrk="1" hangingPunct="1"/>
             <a:r>
-              <a:rPr lang="en-US" b="1"/>
+              <a:rPr lang="en-US" b="1" dirty="0"/>
               <a:t>Hypothesis</a:t>
             </a:r>
           </a:p>
@@ -7163,7 +7160,7 @@
         </p:nvSpPr>
         <p:spPr bwMode="auto">
           <a:xfrm>
-            <a:off x="38619113" y="20937538"/>
+            <a:off x="38742020" y="21715949"/>
             <a:ext cx="9923462" cy="769937"/>
           </a:xfrm>
           <a:prstGeom prst="rect">
@@ -7316,7 +7313,7 @@
           <a:p>
             <a:pPr algn="ctr" eaLnBrk="1" hangingPunct="1"/>
             <a:r>
-              <a:rPr lang="en-US" b="1">
+              <a:rPr lang="en-US" b="1" dirty="0">
                 <a:solidFill>
                   <a:schemeClr val="tx2"/>
                 </a:solidFill>
@@ -7336,7 +7333,7 @@
         </p:nvSpPr>
         <p:spPr bwMode="auto">
           <a:xfrm>
-            <a:off x="13017500" y="5303838"/>
+            <a:off x="13017500" y="5180931"/>
             <a:ext cx="12155488" cy="768350"/>
           </a:xfrm>
           <a:prstGeom prst="rect">
@@ -7495,384 +7492,6 @@
           </a:p>
         </p:txBody>
       </p:sp>
-      <p:pic>
-        <p:nvPicPr>
-          <p:cNvPr id="3093" name="Picture 37" descr="Untitled.jpg"/>
-          <p:cNvPicPr>
-            <a:picLocks noChangeAspect="1"/>
-          </p:cNvPicPr>
-          <p:nvPr/>
-        </p:nvPicPr>
-        <p:blipFill>
-          <a:blip r:embed="rId2">
-            <a:extLst>
-              <a:ext uri="{28A0092B-C50C-407E-A947-70E740481C1C}">
-                <a14:useLocalDpi xmlns:a14="http://schemas.microsoft.com/office/drawing/2010/main" val="0"/>
-              </a:ext>
-            </a:extLst>
-          </a:blip>
-          <a:srcRect/>
-          <a:stretch>
-            <a:fillRect/>
-          </a:stretch>
-        </p:blipFill>
-        <p:spPr bwMode="auto">
-          <a:xfrm>
-            <a:off x="25979438" y="12195175"/>
-            <a:ext cx="5908675" cy="4578350"/>
-          </a:xfrm>
-          <a:prstGeom prst="rect">
-            <a:avLst/>
-          </a:prstGeom>
-          <a:noFill/>
-          <a:ln>
-            <a:noFill/>
-          </a:ln>
-          <a:extLst>
-            <a:ext uri="{909E8E84-426E-40dd-AFC4-6F175D3DCCD1}">
-              <a14:hiddenFill xmlns:a14="http://schemas.microsoft.com/office/drawing/2010/main">
-                <a:solidFill>
-                  <a:srgbClr val="FFFFFF"/>
-                </a:solidFill>
-              </a14:hiddenFill>
-            </a:ext>
-            <a:ext uri="{91240B29-F687-4f45-9708-019B960494DF}">
-              <a14:hiddenLine xmlns:a14="http://schemas.microsoft.com/office/drawing/2010/main" w="9525">
-                <a:solidFill>
-                  <a:srgbClr val="000000"/>
-                </a:solidFill>
-                <a:miter lim="800000"/>
-                <a:headEnd/>
-                <a:tailEnd/>
-              </a14:hiddenLine>
-            </a:ext>
-          </a:extLst>
-        </p:spPr>
-      </p:pic>
-      <p:pic>
-        <p:nvPicPr>
-          <p:cNvPr id="3094" name="Picture 38" descr="1.jpg"/>
-          <p:cNvPicPr>
-            <a:picLocks noChangeAspect="1"/>
-          </p:cNvPicPr>
-          <p:nvPr/>
-        </p:nvPicPr>
-        <p:blipFill>
-          <a:blip r:embed="rId3">
-            <a:extLst>
-              <a:ext uri="{28A0092B-C50C-407E-A947-70E740481C1C}">
-                <a14:useLocalDpi xmlns:a14="http://schemas.microsoft.com/office/drawing/2010/main" val="0"/>
-              </a:ext>
-            </a:extLst>
-          </a:blip>
-          <a:srcRect/>
-          <a:stretch>
-            <a:fillRect/>
-          </a:stretch>
-        </p:blipFill>
-        <p:spPr bwMode="auto">
-          <a:xfrm>
-            <a:off x="25977850" y="6461125"/>
-            <a:ext cx="5843588" cy="4535488"/>
-          </a:xfrm>
-          <a:prstGeom prst="rect">
-            <a:avLst/>
-          </a:prstGeom>
-          <a:noFill/>
-          <a:ln>
-            <a:noFill/>
-          </a:ln>
-          <a:extLst>
-            <a:ext uri="{909E8E84-426E-40dd-AFC4-6F175D3DCCD1}">
-              <a14:hiddenFill xmlns:a14="http://schemas.microsoft.com/office/drawing/2010/main">
-                <a:solidFill>
-                  <a:srgbClr val="FFFFFF"/>
-                </a:solidFill>
-              </a14:hiddenFill>
-            </a:ext>
-            <a:ext uri="{91240B29-F687-4f45-9708-019B960494DF}">
-              <a14:hiddenLine xmlns:a14="http://schemas.microsoft.com/office/drawing/2010/main" w="9525">
-                <a:solidFill>
-                  <a:srgbClr val="000000"/>
-                </a:solidFill>
-                <a:miter lim="800000"/>
-                <a:headEnd/>
-                <a:tailEnd/>
-              </a14:hiddenLine>
-            </a:ext>
-          </a:extLst>
-        </p:spPr>
-      </p:pic>
-      <p:pic>
-        <p:nvPicPr>
-          <p:cNvPr id="3095" name="Picture 39" descr="4.jpg"/>
-          <p:cNvPicPr>
-            <a:picLocks noChangeAspect="1"/>
-          </p:cNvPicPr>
-          <p:nvPr/>
-        </p:nvPicPr>
-        <p:blipFill>
-          <a:blip r:embed="rId4">
-            <a:extLst>
-              <a:ext uri="{28A0092B-C50C-407E-A947-70E740481C1C}">
-                <a14:useLocalDpi xmlns:a14="http://schemas.microsoft.com/office/drawing/2010/main" val="0"/>
-              </a:ext>
-            </a:extLst>
-          </a:blip>
-          <a:srcRect/>
-          <a:stretch>
-            <a:fillRect/>
-          </a:stretch>
-        </p:blipFill>
-        <p:spPr bwMode="auto">
-          <a:xfrm>
-            <a:off x="13309600" y="13423900"/>
-            <a:ext cx="5607050" cy="4524375"/>
-          </a:xfrm>
-          <a:prstGeom prst="rect">
-            <a:avLst/>
-          </a:prstGeom>
-          <a:noFill/>
-          <a:ln>
-            <a:noFill/>
-          </a:ln>
-          <a:extLst>
-            <a:ext uri="{909E8E84-426E-40dd-AFC4-6F175D3DCCD1}">
-              <a14:hiddenFill xmlns:a14="http://schemas.microsoft.com/office/drawing/2010/main">
-                <a:solidFill>
-                  <a:srgbClr val="FFFFFF"/>
-                </a:solidFill>
-              </a14:hiddenFill>
-            </a:ext>
-            <a:ext uri="{91240B29-F687-4f45-9708-019B960494DF}">
-              <a14:hiddenLine xmlns:a14="http://schemas.microsoft.com/office/drawing/2010/main" w="9525">
-                <a:solidFill>
-                  <a:srgbClr val="000000"/>
-                </a:solidFill>
-                <a:miter lim="800000"/>
-                <a:headEnd/>
-                <a:tailEnd/>
-              </a14:hiddenLine>
-            </a:ext>
-          </a:extLst>
-        </p:spPr>
-      </p:pic>
-      <p:pic>
-        <p:nvPicPr>
-          <p:cNvPr id="3096" name="Picture 40" descr="5.jpg"/>
-          <p:cNvPicPr>
-            <a:picLocks noChangeAspect="1"/>
-          </p:cNvPicPr>
-          <p:nvPr/>
-        </p:nvPicPr>
-        <p:blipFill>
-          <a:blip r:embed="rId5">
-            <a:extLst>
-              <a:ext uri="{28A0092B-C50C-407E-A947-70E740481C1C}">
-                <a14:useLocalDpi xmlns:a14="http://schemas.microsoft.com/office/drawing/2010/main" val="0"/>
-              </a:ext>
-            </a:extLst>
-          </a:blip>
-          <a:srcRect/>
-          <a:stretch>
-            <a:fillRect/>
-          </a:stretch>
-        </p:blipFill>
-        <p:spPr bwMode="auto">
-          <a:xfrm>
-            <a:off x="13617575" y="20326350"/>
-            <a:ext cx="11015663" cy="8602663"/>
-          </a:xfrm>
-          <a:prstGeom prst="rect">
-            <a:avLst/>
-          </a:prstGeom>
-          <a:noFill/>
-          <a:ln>
-            <a:noFill/>
-          </a:ln>
-          <a:extLst>
-            <a:ext uri="{909E8E84-426E-40dd-AFC4-6F175D3DCCD1}">
-              <a14:hiddenFill xmlns:a14="http://schemas.microsoft.com/office/drawing/2010/main">
-                <a:solidFill>
-                  <a:srgbClr val="FFFFFF"/>
-                </a:solidFill>
-              </a14:hiddenFill>
-            </a:ext>
-            <a:ext uri="{91240B29-F687-4f45-9708-019B960494DF}">
-              <a14:hiddenLine xmlns:a14="http://schemas.microsoft.com/office/drawing/2010/main" w="9525">
-                <a:solidFill>
-                  <a:srgbClr val="000000"/>
-                </a:solidFill>
-                <a:miter lim="800000"/>
-                <a:headEnd/>
-                <a:tailEnd/>
-              </a14:hiddenLine>
-            </a:ext>
-          </a:extLst>
-        </p:spPr>
-      </p:pic>
-      <p:pic>
-        <p:nvPicPr>
-          <p:cNvPr id="3097" name="Picture 41" descr="6.jpg"/>
-          <p:cNvPicPr>
-            <a:picLocks noChangeAspect="1"/>
-          </p:cNvPicPr>
-          <p:nvPr/>
-        </p:nvPicPr>
-        <p:blipFill>
-          <a:blip r:embed="rId6">
-            <a:extLst>
-              <a:ext uri="{28A0092B-C50C-407E-A947-70E740481C1C}">
-                <a14:useLocalDpi xmlns:a14="http://schemas.microsoft.com/office/drawing/2010/main" val="0"/>
-              </a:ext>
-            </a:extLst>
-          </a:blip>
-          <a:srcRect/>
-          <a:stretch>
-            <a:fillRect/>
-          </a:stretch>
-        </p:blipFill>
-        <p:spPr bwMode="auto">
-          <a:xfrm>
-            <a:off x="32094488" y="12187238"/>
-            <a:ext cx="5802312" cy="4587875"/>
-          </a:xfrm>
-          <a:prstGeom prst="rect">
-            <a:avLst/>
-          </a:prstGeom>
-          <a:noFill/>
-          <a:ln>
-            <a:noFill/>
-          </a:ln>
-          <a:extLst>
-            <a:ext uri="{909E8E84-426E-40dd-AFC4-6F175D3DCCD1}">
-              <a14:hiddenFill xmlns:a14="http://schemas.microsoft.com/office/drawing/2010/main">
-                <a:solidFill>
-                  <a:srgbClr val="FFFFFF"/>
-                </a:solidFill>
-              </a14:hiddenFill>
-            </a:ext>
-            <a:ext uri="{91240B29-F687-4f45-9708-019B960494DF}">
-              <a14:hiddenLine xmlns:a14="http://schemas.microsoft.com/office/drawing/2010/main" w="9525">
-                <a:solidFill>
-                  <a:srgbClr val="000000"/>
-                </a:solidFill>
-                <a:miter lim="800000"/>
-                <a:headEnd/>
-                <a:tailEnd/>
-              </a14:hiddenLine>
-            </a:ext>
-          </a:extLst>
-        </p:spPr>
-      </p:pic>
-      <p:pic>
-        <p:nvPicPr>
-          <p:cNvPr id="3098" name="Picture 42" descr="8.jpg"/>
-          <p:cNvPicPr>
-            <a:picLocks noChangeAspect="1"/>
-          </p:cNvPicPr>
-          <p:nvPr/>
-        </p:nvPicPr>
-        <p:blipFill>
-          <a:blip r:embed="rId7">
-            <a:extLst>
-              <a:ext uri="{28A0092B-C50C-407E-A947-70E740481C1C}">
-                <a14:useLocalDpi xmlns:a14="http://schemas.microsoft.com/office/drawing/2010/main" val="0"/>
-              </a:ext>
-            </a:extLst>
-          </a:blip>
-          <a:srcRect/>
-          <a:stretch>
-            <a:fillRect/>
-          </a:stretch>
-        </p:blipFill>
-        <p:spPr bwMode="auto">
-          <a:xfrm>
-            <a:off x="32018288" y="6443663"/>
-            <a:ext cx="5881687" cy="4562475"/>
-          </a:xfrm>
-          <a:prstGeom prst="rect">
-            <a:avLst/>
-          </a:prstGeom>
-          <a:noFill/>
-          <a:ln>
-            <a:noFill/>
-          </a:ln>
-          <a:extLst>
-            <a:ext uri="{909E8E84-426E-40dd-AFC4-6F175D3DCCD1}">
-              <a14:hiddenFill xmlns:a14="http://schemas.microsoft.com/office/drawing/2010/main">
-                <a:solidFill>
-                  <a:srgbClr val="FFFFFF"/>
-                </a:solidFill>
-              </a14:hiddenFill>
-            </a:ext>
-            <a:ext uri="{91240B29-F687-4f45-9708-019B960494DF}">
-              <a14:hiddenLine xmlns:a14="http://schemas.microsoft.com/office/drawing/2010/main" w="9525">
-                <a:solidFill>
-                  <a:srgbClr val="000000"/>
-                </a:solidFill>
-                <a:miter lim="800000"/>
-                <a:headEnd/>
-                <a:tailEnd/>
-              </a14:hiddenLine>
-            </a:ext>
-          </a:extLst>
-        </p:spPr>
-      </p:pic>
-      <p:pic>
-        <p:nvPicPr>
-          <p:cNvPr id="3099" name="Picture 46" descr="12.jpg"/>
-          <p:cNvPicPr>
-            <a:picLocks noChangeAspect="1"/>
-          </p:cNvPicPr>
-          <p:nvPr/>
-        </p:nvPicPr>
-        <p:blipFill>
-          <a:blip r:embed="rId8">
-            <a:extLst>
-              <a:ext uri="{28A0092B-C50C-407E-A947-70E740481C1C}">
-                <a14:useLocalDpi xmlns:a14="http://schemas.microsoft.com/office/drawing/2010/main" val="0"/>
-              </a:ext>
-            </a:extLst>
-          </a:blip>
-          <a:srcRect/>
-          <a:stretch>
-            <a:fillRect/>
-          </a:stretch>
-        </p:blipFill>
-        <p:spPr bwMode="auto">
-          <a:xfrm>
-            <a:off x="19289713" y="13463588"/>
-            <a:ext cx="5665787" cy="4530725"/>
-          </a:xfrm>
-          <a:prstGeom prst="rect">
-            <a:avLst/>
-          </a:prstGeom>
-          <a:noFill/>
-          <a:ln>
-            <a:noFill/>
-          </a:ln>
-          <a:extLst>
-            <a:ext uri="{909E8E84-426E-40dd-AFC4-6F175D3DCCD1}">
-              <a14:hiddenFill xmlns:a14="http://schemas.microsoft.com/office/drawing/2010/main">
-                <a:solidFill>
-                  <a:srgbClr val="FFFFFF"/>
-                </a:solidFill>
-              </a14:hiddenFill>
-            </a:ext>
-            <a:ext uri="{91240B29-F687-4f45-9708-019B960494DF}">
-              <a14:hiddenLine xmlns:a14="http://schemas.microsoft.com/office/drawing/2010/main" w="9525">
-                <a:solidFill>
-                  <a:srgbClr val="000000"/>
-                </a:solidFill>
-                <a:miter lim="800000"/>
-                <a:headEnd/>
-                <a:tailEnd/>
-              </a14:hiddenLine>
-            </a:ext>
-          </a:extLst>
-        </p:spPr>
-      </p:pic>
       <p:sp>
         <p:nvSpPr>
           <p:cNvPr id="3100" name="TextBox 47"/>
@@ -7883,7 +7502,7 @@
         </p:nvSpPr>
         <p:spPr bwMode="auto">
           <a:xfrm>
-            <a:off x="13096875" y="12287250"/>
+            <a:off x="13137844" y="16916747"/>
             <a:ext cx="12103100" cy="768350"/>
           </a:xfrm>
           <a:prstGeom prst="rect">
@@ -8038,1373 +7657,6 @@
             <a:r>
               <a:rPr lang="en-US" b="1" dirty="0"/>
               <a:t>Results</a:t>
-            </a:r>
-          </a:p>
-        </p:txBody>
-      </p:sp>
-      <p:sp>
-        <p:nvSpPr>
-          <p:cNvPr id="3101" name="TextBox 54"/>
-          <p:cNvSpPr txBox="1">
-            <a:spLocks noChangeArrowheads="1"/>
-          </p:cNvSpPr>
-          <p:nvPr/>
-        </p:nvSpPr>
-        <p:spPr bwMode="auto">
-          <a:xfrm>
-            <a:off x="13300075" y="18402300"/>
-            <a:ext cx="5191125" cy="584776"/>
-          </a:xfrm>
-          <a:prstGeom prst="rect">
-            <a:avLst/>
-          </a:prstGeom>
-          <a:noFill/>
-          <a:ln>
-            <a:noFill/>
-          </a:ln>
-          <a:extLst>
-            <a:ext uri="{909E8E84-426E-40dd-AFC4-6F175D3DCCD1}">
-              <a14:hiddenFill xmlns:a14="http://schemas.microsoft.com/office/drawing/2010/main">
-                <a:solidFill>
-                  <a:srgbClr val="FFFFFF"/>
-                </a:solidFill>
-              </a14:hiddenFill>
-            </a:ext>
-            <a:ext uri="{91240B29-F687-4f45-9708-019B960494DF}">
-              <a14:hiddenLine xmlns:a14="http://schemas.microsoft.com/office/drawing/2010/main" w="9525">
-                <a:solidFill>
-                  <a:srgbClr val="000000"/>
-                </a:solidFill>
-                <a:miter lim="800000"/>
-                <a:headEnd/>
-                <a:tailEnd/>
-              </a14:hiddenLine>
-            </a:ext>
-          </a:extLst>
-        </p:spPr>
-        <p:txBody>
-          <a:bodyPr>
-            <a:spAutoFit/>
-          </a:bodyPr>
-          <a:lstStyle>
-            <a:lvl1pPr eaLnBrk="0" hangingPunct="0">
-              <a:defRPr sz="4400">
-                <a:solidFill>
-                  <a:schemeClr val="tx1"/>
-                </a:solidFill>
-                <a:latin typeface="Arial" charset="0"/>
-                <a:ea typeface="ＭＳ Ｐゴシック" charset="0"/>
-                <a:cs typeface="Arial" charset="0"/>
-              </a:defRPr>
-            </a:lvl1pPr>
-            <a:lvl2pPr marL="742950" indent="-285750" eaLnBrk="0" hangingPunct="0">
-              <a:defRPr sz="4400">
-                <a:solidFill>
-                  <a:schemeClr val="tx1"/>
-                </a:solidFill>
-                <a:latin typeface="Arial" charset="0"/>
-                <a:ea typeface="Arial" charset="0"/>
-                <a:cs typeface="Arial" charset="0"/>
-              </a:defRPr>
-            </a:lvl2pPr>
-            <a:lvl3pPr marL="1143000" indent="-228600" eaLnBrk="0" hangingPunct="0">
-              <a:defRPr sz="4400">
-                <a:solidFill>
-                  <a:schemeClr val="tx1"/>
-                </a:solidFill>
-                <a:latin typeface="Arial" charset="0"/>
-                <a:ea typeface="Arial" charset="0"/>
-                <a:cs typeface="Arial" charset="0"/>
-              </a:defRPr>
-            </a:lvl3pPr>
-            <a:lvl4pPr marL="1600200" indent="-228600" eaLnBrk="0" hangingPunct="0">
-              <a:defRPr sz="4400">
-                <a:solidFill>
-                  <a:schemeClr val="tx1"/>
-                </a:solidFill>
-                <a:latin typeface="Arial" charset="0"/>
-                <a:ea typeface="Arial" charset="0"/>
-                <a:cs typeface="Arial" charset="0"/>
-              </a:defRPr>
-            </a:lvl4pPr>
-            <a:lvl5pPr marL="2057400" indent="-228600" eaLnBrk="0" hangingPunct="0">
-              <a:defRPr sz="4400">
-                <a:solidFill>
-                  <a:schemeClr val="tx1"/>
-                </a:solidFill>
-                <a:latin typeface="Arial" charset="0"/>
-                <a:ea typeface="Arial" charset="0"/>
-                <a:cs typeface="Arial" charset="0"/>
-              </a:defRPr>
-            </a:lvl5pPr>
-            <a:lvl6pPr marL="2514600" indent="-228600" eaLnBrk="0" fontAlgn="base" hangingPunct="0">
-              <a:spcBef>
-                <a:spcPct val="0"/>
-              </a:spcBef>
-              <a:spcAft>
-                <a:spcPct val="0"/>
-              </a:spcAft>
-              <a:defRPr sz="4400">
-                <a:solidFill>
-                  <a:schemeClr val="tx1"/>
-                </a:solidFill>
-                <a:latin typeface="Arial" charset="0"/>
-                <a:ea typeface="Arial" charset="0"/>
-                <a:cs typeface="Arial" charset="0"/>
-              </a:defRPr>
-            </a:lvl6pPr>
-            <a:lvl7pPr marL="2971800" indent="-228600" eaLnBrk="0" fontAlgn="base" hangingPunct="0">
-              <a:spcBef>
-                <a:spcPct val="0"/>
-              </a:spcBef>
-              <a:spcAft>
-                <a:spcPct val="0"/>
-              </a:spcAft>
-              <a:defRPr sz="4400">
-                <a:solidFill>
-                  <a:schemeClr val="tx1"/>
-                </a:solidFill>
-                <a:latin typeface="Arial" charset="0"/>
-                <a:ea typeface="Arial" charset="0"/>
-                <a:cs typeface="Arial" charset="0"/>
-              </a:defRPr>
-            </a:lvl7pPr>
-            <a:lvl8pPr marL="3429000" indent="-228600" eaLnBrk="0" fontAlgn="base" hangingPunct="0">
-              <a:spcBef>
-                <a:spcPct val="0"/>
-              </a:spcBef>
-              <a:spcAft>
-                <a:spcPct val="0"/>
-              </a:spcAft>
-              <a:defRPr sz="4400">
-                <a:solidFill>
-                  <a:schemeClr val="tx1"/>
-                </a:solidFill>
-                <a:latin typeface="Arial" charset="0"/>
-                <a:ea typeface="Arial" charset="0"/>
-                <a:cs typeface="Arial" charset="0"/>
-              </a:defRPr>
-            </a:lvl8pPr>
-            <a:lvl9pPr marL="3886200" indent="-228600" eaLnBrk="0" fontAlgn="base" hangingPunct="0">
-              <a:spcBef>
-                <a:spcPct val="0"/>
-              </a:spcBef>
-              <a:spcAft>
-                <a:spcPct val="0"/>
-              </a:spcAft>
-              <a:defRPr sz="4400">
-                <a:solidFill>
-                  <a:schemeClr val="tx1"/>
-                </a:solidFill>
-                <a:latin typeface="Arial" charset="0"/>
-                <a:ea typeface="Arial" charset="0"/>
-                <a:cs typeface="Arial" charset="0"/>
-              </a:defRPr>
-            </a:lvl9pPr>
-          </a:lstStyle>
-          <a:p>
-            <a:pPr algn="ctr" eaLnBrk="1" hangingPunct="1"/>
-            <a:r>
-              <a:rPr lang="en-US" sz="3200" dirty="0"/>
-              <a:t>Graph 1</a:t>
-            </a:r>
-            <a:r>
-              <a:rPr lang="en-US" sz="3200" dirty="0" smtClean="0"/>
-              <a:t>:</a:t>
-            </a:r>
-            <a:endParaRPr lang="en-US" sz="3200" dirty="0"/>
-          </a:p>
-        </p:txBody>
-      </p:sp>
-      <p:sp>
-        <p:nvSpPr>
-          <p:cNvPr id="3102" name="TextBox 55"/>
-          <p:cNvSpPr txBox="1">
-            <a:spLocks noChangeArrowheads="1"/>
-          </p:cNvSpPr>
-          <p:nvPr/>
-        </p:nvSpPr>
-        <p:spPr bwMode="auto">
-          <a:xfrm>
-            <a:off x="32004000" y="5749925"/>
-            <a:ext cx="5895975" cy="584200"/>
-          </a:xfrm>
-          <a:prstGeom prst="rect">
-            <a:avLst/>
-          </a:prstGeom>
-          <a:noFill/>
-          <a:ln>
-            <a:noFill/>
-          </a:ln>
-          <a:extLst>
-            <a:ext uri="{909E8E84-426E-40dd-AFC4-6F175D3DCCD1}">
-              <a14:hiddenFill xmlns:a14="http://schemas.microsoft.com/office/drawing/2010/main">
-                <a:solidFill>
-                  <a:srgbClr val="FFFFFF"/>
-                </a:solidFill>
-              </a14:hiddenFill>
-            </a:ext>
-            <a:ext uri="{91240B29-F687-4f45-9708-019B960494DF}">
-              <a14:hiddenLine xmlns:a14="http://schemas.microsoft.com/office/drawing/2010/main" w="9525">
-                <a:solidFill>
-                  <a:srgbClr val="000000"/>
-                </a:solidFill>
-                <a:miter lim="800000"/>
-                <a:headEnd/>
-                <a:tailEnd/>
-              </a14:hiddenLine>
-            </a:ext>
-          </a:extLst>
-        </p:spPr>
-        <p:txBody>
-          <a:bodyPr>
-            <a:spAutoFit/>
-          </a:bodyPr>
-          <a:lstStyle>
-            <a:lvl1pPr eaLnBrk="0" hangingPunct="0">
-              <a:defRPr sz="4400">
-                <a:solidFill>
-                  <a:schemeClr val="tx1"/>
-                </a:solidFill>
-                <a:latin typeface="Arial" charset="0"/>
-                <a:ea typeface="ＭＳ Ｐゴシック" charset="0"/>
-                <a:cs typeface="Arial" charset="0"/>
-              </a:defRPr>
-            </a:lvl1pPr>
-            <a:lvl2pPr marL="742950" indent="-285750" eaLnBrk="0" hangingPunct="0">
-              <a:defRPr sz="4400">
-                <a:solidFill>
-                  <a:schemeClr val="tx1"/>
-                </a:solidFill>
-                <a:latin typeface="Arial" charset="0"/>
-                <a:ea typeface="Arial" charset="0"/>
-                <a:cs typeface="Arial" charset="0"/>
-              </a:defRPr>
-            </a:lvl2pPr>
-            <a:lvl3pPr marL="1143000" indent="-228600" eaLnBrk="0" hangingPunct="0">
-              <a:defRPr sz="4400">
-                <a:solidFill>
-                  <a:schemeClr val="tx1"/>
-                </a:solidFill>
-                <a:latin typeface="Arial" charset="0"/>
-                <a:ea typeface="Arial" charset="0"/>
-                <a:cs typeface="Arial" charset="0"/>
-              </a:defRPr>
-            </a:lvl3pPr>
-            <a:lvl4pPr marL="1600200" indent="-228600" eaLnBrk="0" hangingPunct="0">
-              <a:defRPr sz="4400">
-                <a:solidFill>
-                  <a:schemeClr val="tx1"/>
-                </a:solidFill>
-                <a:latin typeface="Arial" charset="0"/>
-                <a:ea typeface="Arial" charset="0"/>
-                <a:cs typeface="Arial" charset="0"/>
-              </a:defRPr>
-            </a:lvl4pPr>
-            <a:lvl5pPr marL="2057400" indent="-228600" eaLnBrk="0" hangingPunct="0">
-              <a:defRPr sz="4400">
-                <a:solidFill>
-                  <a:schemeClr val="tx1"/>
-                </a:solidFill>
-                <a:latin typeface="Arial" charset="0"/>
-                <a:ea typeface="Arial" charset="0"/>
-                <a:cs typeface="Arial" charset="0"/>
-              </a:defRPr>
-            </a:lvl5pPr>
-            <a:lvl6pPr marL="2514600" indent="-228600" eaLnBrk="0" fontAlgn="base" hangingPunct="0">
-              <a:spcBef>
-                <a:spcPct val="0"/>
-              </a:spcBef>
-              <a:spcAft>
-                <a:spcPct val="0"/>
-              </a:spcAft>
-              <a:defRPr sz="4400">
-                <a:solidFill>
-                  <a:schemeClr val="tx1"/>
-                </a:solidFill>
-                <a:latin typeface="Arial" charset="0"/>
-                <a:ea typeface="Arial" charset="0"/>
-                <a:cs typeface="Arial" charset="0"/>
-              </a:defRPr>
-            </a:lvl6pPr>
-            <a:lvl7pPr marL="2971800" indent="-228600" eaLnBrk="0" fontAlgn="base" hangingPunct="0">
-              <a:spcBef>
-                <a:spcPct val="0"/>
-              </a:spcBef>
-              <a:spcAft>
-                <a:spcPct val="0"/>
-              </a:spcAft>
-              <a:defRPr sz="4400">
-                <a:solidFill>
-                  <a:schemeClr val="tx1"/>
-                </a:solidFill>
-                <a:latin typeface="Arial" charset="0"/>
-                <a:ea typeface="Arial" charset="0"/>
-                <a:cs typeface="Arial" charset="0"/>
-              </a:defRPr>
-            </a:lvl7pPr>
-            <a:lvl8pPr marL="3429000" indent="-228600" eaLnBrk="0" fontAlgn="base" hangingPunct="0">
-              <a:spcBef>
-                <a:spcPct val="0"/>
-              </a:spcBef>
-              <a:spcAft>
-                <a:spcPct val="0"/>
-              </a:spcAft>
-              <a:defRPr sz="4400">
-                <a:solidFill>
-                  <a:schemeClr val="tx1"/>
-                </a:solidFill>
-                <a:latin typeface="Arial" charset="0"/>
-                <a:ea typeface="Arial" charset="0"/>
-                <a:cs typeface="Arial" charset="0"/>
-              </a:defRPr>
-            </a:lvl8pPr>
-            <a:lvl9pPr marL="3886200" indent="-228600" eaLnBrk="0" fontAlgn="base" hangingPunct="0">
-              <a:spcBef>
-                <a:spcPct val="0"/>
-              </a:spcBef>
-              <a:spcAft>
-                <a:spcPct val="0"/>
-              </a:spcAft>
-              <a:defRPr sz="4400">
-                <a:solidFill>
-                  <a:schemeClr val="tx1"/>
-                </a:solidFill>
-                <a:latin typeface="Arial" charset="0"/>
-                <a:ea typeface="Arial" charset="0"/>
-                <a:cs typeface="Arial" charset="0"/>
-              </a:defRPr>
-            </a:lvl9pPr>
-          </a:lstStyle>
-          <a:p>
-            <a:pPr algn="ctr" eaLnBrk="1" hangingPunct="1"/>
-            <a:r>
-              <a:rPr lang="en-US" sz="3200"/>
-              <a:t>Graph 5: Research Misconduct</a:t>
-            </a:r>
-          </a:p>
-        </p:txBody>
-      </p:sp>
-      <p:sp>
-        <p:nvSpPr>
-          <p:cNvPr id="3103" name="TextBox 56"/>
-          <p:cNvSpPr txBox="1">
-            <a:spLocks noChangeArrowheads="1"/>
-          </p:cNvSpPr>
-          <p:nvPr/>
-        </p:nvSpPr>
-        <p:spPr bwMode="auto">
-          <a:xfrm>
-            <a:off x="25919113" y="5743575"/>
-            <a:ext cx="6169025" cy="585788"/>
-          </a:xfrm>
-          <a:prstGeom prst="rect">
-            <a:avLst/>
-          </a:prstGeom>
-          <a:noFill/>
-          <a:ln>
-            <a:noFill/>
-          </a:ln>
-          <a:extLst>
-            <a:ext uri="{909E8E84-426E-40dd-AFC4-6F175D3DCCD1}">
-              <a14:hiddenFill xmlns:a14="http://schemas.microsoft.com/office/drawing/2010/main">
-                <a:solidFill>
-                  <a:srgbClr val="FFFFFF"/>
-                </a:solidFill>
-              </a14:hiddenFill>
-            </a:ext>
-            <a:ext uri="{91240B29-F687-4f45-9708-019B960494DF}">
-              <a14:hiddenLine xmlns:a14="http://schemas.microsoft.com/office/drawing/2010/main" w="9525">
-                <a:solidFill>
-                  <a:srgbClr val="000000"/>
-                </a:solidFill>
-                <a:miter lim="800000"/>
-                <a:headEnd/>
-                <a:tailEnd/>
-              </a14:hiddenLine>
-            </a:ext>
-          </a:extLst>
-        </p:spPr>
-        <p:txBody>
-          <a:bodyPr>
-            <a:spAutoFit/>
-          </a:bodyPr>
-          <a:lstStyle>
-            <a:lvl1pPr eaLnBrk="0" hangingPunct="0">
-              <a:defRPr sz="4400">
-                <a:solidFill>
-                  <a:schemeClr val="tx1"/>
-                </a:solidFill>
-                <a:latin typeface="Arial" charset="0"/>
-                <a:ea typeface="ＭＳ Ｐゴシック" charset="0"/>
-                <a:cs typeface="Arial" charset="0"/>
-              </a:defRPr>
-            </a:lvl1pPr>
-            <a:lvl2pPr marL="742950" indent="-285750" eaLnBrk="0" hangingPunct="0">
-              <a:defRPr sz="4400">
-                <a:solidFill>
-                  <a:schemeClr val="tx1"/>
-                </a:solidFill>
-                <a:latin typeface="Arial" charset="0"/>
-                <a:ea typeface="Arial" charset="0"/>
-                <a:cs typeface="Arial" charset="0"/>
-              </a:defRPr>
-            </a:lvl2pPr>
-            <a:lvl3pPr marL="1143000" indent="-228600" eaLnBrk="0" hangingPunct="0">
-              <a:defRPr sz="4400">
-                <a:solidFill>
-                  <a:schemeClr val="tx1"/>
-                </a:solidFill>
-                <a:latin typeface="Arial" charset="0"/>
-                <a:ea typeface="Arial" charset="0"/>
-                <a:cs typeface="Arial" charset="0"/>
-              </a:defRPr>
-            </a:lvl3pPr>
-            <a:lvl4pPr marL="1600200" indent="-228600" eaLnBrk="0" hangingPunct="0">
-              <a:defRPr sz="4400">
-                <a:solidFill>
-                  <a:schemeClr val="tx1"/>
-                </a:solidFill>
-                <a:latin typeface="Arial" charset="0"/>
-                <a:ea typeface="Arial" charset="0"/>
-                <a:cs typeface="Arial" charset="0"/>
-              </a:defRPr>
-            </a:lvl4pPr>
-            <a:lvl5pPr marL="2057400" indent="-228600" eaLnBrk="0" hangingPunct="0">
-              <a:defRPr sz="4400">
-                <a:solidFill>
-                  <a:schemeClr val="tx1"/>
-                </a:solidFill>
-                <a:latin typeface="Arial" charset="0"/>
-                <a:ea typeface="Arial" charset="0"/>
-                <a:cs typeface="Arial" charset="0"/>
-              </a:defRPr>
-            </a:lvl5pPr>
-            <a:lvl6pPr marL="2514600" indent="-228600" eaLnBrk="0" fontAlgn="base" hangingPunct="0">
-              <a:spcBef>
-                <a:spcPct val="0"/>
-              </a:spcBef>
-              <a:spcAft>
-                <a:spcPct val="0"/>
-              </a:spcAft>
-              <a:defRPr sz="4400">
-                <a:solidFill>
-                  <a:schemeClr val="tx1"/>
-                </a:solidFill>
-                <a:latin typeface="Arial" charset="0"/>
-                <a:ea typeface="Arial" charset="0"/>
-                <a:cs typeface="Arial" charset="0"/>
-              </a:defRPr>
-            </a:lvl6pPr>
-            <a:lvl7pPr marL="2971800" indent="-228600" eaLnBrk="0" fontAlgn="base" hangingPunct="0">
-              <a:spcBef>
-                <a:spcPct val="0"/>
-              </a:spcBef>
-              <a:spcAft>
-                <a:spcPct val="0"/>
-              </a:spcAft>
-              <a:defRPr sz="4400">
-                <a:solidFill>
-                  <a:schemeClr val="tx1"/>
-                </a:solidFill>
-                <a:latin typeface="Arial" charset="0"/>
-                <a:ea typeface="Arial" charset="0"/>
-                <a:cs typeface="Arial" charset="0"/>
-              </a:defRPr>
-            </a:lvl7pPr>
-            <a:lvl8pPr marL="3429000" indent="-228600" eaLnBrk="0" fontAlgn="base" hangingPunct="0">
-              <a:spcBef>
-                <a:spcPct val="0"/>
-              </a:spcBef>
-              <a:spcAft>
-                <a:spcPct val="0"/>
-              </a:spcAft>
-              <a:defRPr sz="4400">
-                <a:solidFill>
-                  <a:schemeClr val="tx1"/>
-                </a:solidFill>
-                <a:latin typeface="Arial" charset="0"/>
-                <a:ea typeface="Arial" charset="0"/>
-                <a:cs typeface="Arial" charset="0"/>
-              </a:defRPr>
-            </a:lvl8pPr>
-            <a:lvl9pPr marL="3886200" indent="-228600" eaLnBrk="0" fontAlgn="base" hangingPunct="0">
-              <a:spcBef>
-                <a:spcPct val="0"/>
-              </a:spcBef>
-              <a:spcAft>
-                <a:spcPct val="0"/>
-              </a:spcAft>
-              <a:defRPr sz="4400">
-                <a:solidFill>
-                  <a:schemeClr val="tx1"/>
-                </a:solidFill>
-                <a:latin typeface="Arial" charset="0"/>
-                <a:ea typeface="Arial" charset="0"/>
-                <a:cs typeface="Arial" charset="0"/>
-              </a:defRPr>
-            </a:lvl9pPr>
-          </a:lstStyle>
-          <a:p>
-            <a:pPr algn="ctr" eaLnBrk="1" hangingPunct="1"/>
-            <a:r>
-              <a:rPr lang="en-US" sz="3200"/>
-              <a:t>Graph 4: Parental Education</a:t>
-            </a:r>
-          </a:p>
-        </p:txBody>
-      </p:sp>
-      <p:sp>
-        <p:nvSpPr>
-          <p:cNvPr id="3104" name="TextBox 57"/>
-          <p:cNvSpPr txBox="1">
-            <a:spLocks noChangeArrowheads="1"/>
-          </p:cNvSpPr>
-          <p:nvPr/>
-        </p:nvSpPr>
-        <p:spPr bwMode="auto">
-          <a:xfrm>
-            <a:off x="26076275" y="11541125"/>
-            <a:ext cx="5911850" cy="584200"/>
-          </a:xfrm>
-          <a:prstGeom prst="rect">
-            <a:avLst/>
-          </a:prstGeom>
-          <a:noFill/>
-          <a:ln>
-            <a:noFill/>
-          </a:ln>
-          <a:extLst>
-            <a:ext uri="{909E8E84-426E-40dd-AFC4-6F175D3DCCD1}">
-              <a14:hiddenFill xmlns:a14="http://schemas.microsoft.com/office/drawing/2010/main">
-                <a:solidFill>
-                  <a:srgbClr val="FFFFFF"/>
-                </a:solidFill>
-              </a14:hiddenFill>
-            </a:ext>
-            <a:ext uri="{91240B29-F687-4f45-9708-019B960494DF}">
-              <a14:hiddenLine xmlns:a14="http://schemas.microsoft.com/office/drawing/2010/main" w="9525">
-                <a:solidFill>
-                  <a:srgbClr val="000000"/>
-                </a:solidFill>
-                <a:miter lim="800000"/>
-                <a:headEnd/>
-                <a:tailEnd/>
-              </a14:hiddenLine>
-            </a:ext>
-          </a:extLst>
-        </p:spPr>
-        <p:txBody>
-          <a:bodyPr>
-            <a:spAutoFit/>
-          </a:bodyPr>
-          <a:lstStyle>
-            <a:lvl1pPr eaLnBrk="0" hangingPunct="0">
-              <a:defRPr sz="4400">
-                <a:solidFill>
-                  <a:schemeClr val="tx1"/>
-                </a:solidFill>
-                <a:latin typeface="Arial" charset="0"/>
-                <a:ea typeface="ＭＳ Ｐゴシック" charset="0"/>
-                <a:cs typeface="Arial" charset="0"/>
-              </a:defRPr>
-            </a:lvl1pPr>
-            <a:lvl2pPr marL="742950" indent="-285750" eaLnBrk="0" hangingPunct="0">
-              <a:defRPr sz="4400">
-                <a:solidFill>
-                  <a:schemeClr val="tx1"/>
-                </a:solidFill>
-                <a:latin typeface="Arial" charset="0"/>
-                <a:ea typeface="Arial" charset="0"/>
-                <a:cs typeface="Arial" charset="0"/>
-              </a:defRPr>
-            </a:lvl2pPr>
-            <a:lvl3pPr marL="1143000" indent="-228600" eaLnBrk="0" hangingPunct="0">
-              <a:defRPr sz="4400">
-                <a:solidFill>
-                  <a:schemeClr val="tx1"/>
-                </a:solidFill>
-                <a:latin typeface="Arial" charset="0"/>
-                <a:ea typeface="Arial" charset="0"/>
-                <a:cs typeface="Arial" charset="0"/>
-              </a:defRPr>
-            </a:lvl3pPr>
-            <a:lvl4pPr marL="1600200" indent="-228600" eaLnBrk="0" hangingPunct="0">
-              <a:defRPr sz="4400">
-                <a:solidFill>
-                  <a:schemeClr val="tx1"/>
-                </a:solidFill>
-                <a:latin typeface="Arial" charset="0"/>
-                <a:ea typeface="Arial" charset="0"/>
-                <a:cs typeface="Arial" charset="0"/>
-              </a:defRPr>
-            </a:lvl4pPr>
-            <a:lvl5pPr marL="2057400" indent="-228600" eaLnBrk="0" hangingPunct="0">
-              <a:defRPr sz="4400">
-                <a:solidFill>
-                  <a:schemeClr val="tx1"/>
-                </a:solidFill>
-                <a:latin typeface="Arial" charset="0"/>
-                <a:ea typeface="Arial" charset="0"/>
-                <a:cs typeface="Arial" charset="0"/>
-              </a:defRPr>
-            </a:lvl5pPr>
-            <a:lvl6pPr marL="2514600" indent="-228600" eaLnBrk="0" fontAlgn="base" hangingPunct="0">
-              <a:spcBef>
-                <a:spcPct val="0"/>
-              </a:spcBef>
-              <a:spcAft>
-                <a:spcPct val="0"/>
-              </a:spcAft>
-              <a:defRPr sz="4400">
-                <a:solidFill>
-                  <a:schemeClr val="tx1"/>
-                </a:solidFill>
-                <a:latin typeface="Arial" charset="0"/>
-                <a:ea typeface="Arial" charset="0"/>
-                <a:cs typeface="Arial" charset="0"/>
-              </a:defRPr>
-            </a:lvl6pPr>
-            <a:lvl7pPr marL="2971800" indent="-228600" eaLnBrk="0" fontAlgn="base" hangingPunct="0">
-              <a:spcBef>
-                <a:spcPct val="0"/>
-              </a:spcBef>
-              <a:spcAft>
-                <a:spcPct val="0"/>
-              </a:spcAft>
-              <a:defRPr sz="4400">
-                <a:solidFill>
-                  <a:schemeClr val="tx1"/>
-                </a:solidFill>
-                <a:latin typeface="Arial" charset="0"/>
-                <a:ea typeface="Arial" charset="0"/>
-                <a:cs typeface="Arial" charset="0"/>
-              </a:defRPr>
-            </a:lvl7pPr>
-            <a:lvl8pPr marL="3429000" indent="-228600" eaLnBrk="0" fontAlgn="base" hangingPunct="0">
-              <a:spcBef>
-                <a:spcPct val="0"/>
-              </a:spcBef>
-              <a:spcAft>
-                <a:spcPct val="0"/>
-              </a:spcAft>
-              <a:defRPr sz="4400">
-                <a:solidFill>
-                  <a:schemeClr val="tx1"/>
-                </a:solidFill>
-                <a:latin typeface="Arial" charset="0"/>
-                <a:ea typeface="Arial" charset="0"/>
-                <a:cs typeface="Arial" charset="0"/>
-              </a:defRPr>
-            </a:lvl8pPr>
-            <a:lvl9pPr marL="3886200" indent="-228600" eaLnBrk="0" fontAlgn="base" hangingPunct="0">
-              <a:spcBef>
-                <a:spcPct val="0"/>
-              </a:spcBef>
-              <a:spcAft>
-                <a:spcPct val="0"/>
-              </a:spcAft>
-              <a:defRPr sz="4400">
-                <a:solidFill>
-                  <a:schemeClr val="tx1"/>
-                </a:solidFill>
-                <a:latin typeface="Arial" charset="0"/>
-                <a:ea typeface="Arial" charset="0"/>
-                <a:cs typeface="Arial" charset="0"/>
-              </a:defRPr>
-            </a:lvl9pPr>
-          </a:lstStyle>
-          <a:p>
-            <a:pPr algn="ctr" eaLnBrk="1" hangingPunct="1"/>
-            <a:r>
-              <a:rPr lang="en-US" sz="3200"/>
-              <a:t>Graph 6: Lab Use</a:t>
-            </a:r>
-          </a:p>
-        </p:txBody>
-      </p:sp>
-      <p:sp>
-        <p:nvSpPr>
-          <p:cNvPr id="3105" name="TextBox 58"/>
-          <p:cNvSpPr txBox="1">
-            <a:spLocks noChangeArrowheads="1"/>
-          </p:cNvSpPr>
-          <p:nvPr/>
-        </p:nvSpPr>
-        <p:spPr bwMode="auto">
-          <a:xfrm>
-            <a:off x="32184975" y="11534775"/>
-            <a:ext cx="5462588" cy="585788"/>
-          </a:xfrm>
-          <a:prstGeom prst="rect">
-            <a:avLst/>
-          </a:prstGeom>
-          <a:noFill/>
-          <a:ln>
-            <a:noFill/>
-          </a:ln>
-          <a:extLst>
-            <a:ext uri="{909E8E84-426E-40dd-AFC4-6F175D3DCCD1}">
-              <a14:hiddenFill xmlns:a14="http://schemas.microsoft.com/office/drawing/2010/main">
-                <a:solidFill>
-                  <a:srgbClr val="FFFFFF"/>
-                </a:solidFill>
-              </a14:hiddenFill>
-            </a:ext>
-            <a:ext uri="{91240B29-F687-4f45-9708-019B960494DF}">
-              <a14:hiddenLine xmlns:a14="http://schemas.microsoft.com/office/drawing/2010/main" w="9525">
-                <a:solidFill>
-                  <a:srgbClr val="000000"/>
-                </a:solidFill>
-                <a:miter lim="800000"/>
-                <a:headEnd/>
-                <a:tailEnd/>
-              </a14:hiddenLine>
-            </a:ext>
-          </a:extLst>
-        </p:spPr>
-        <p:txBody>
-          <a:bodyPr>
-            <a:spAutoFit/>
-          </a:bodyPr>
-          <a:lstStyle>
-            <a:lvl1pPr eaLnBrk="0" hangingPunct="0">
-              <a:defRPr sz="4400">
-                <a:solidFill>
-                  <a:schemeClr val="tx1"/>
-                </a:solidFill>
-                <a:latin typeface="Arial" charset="0"/>
-                <a:ea typeface="ＭＳ Ｐゴシック" charset="0"/>
-                <a:cs typeface="Arial" charset="0"/>
-              </a:defRPr>
-            </a:lvl1pPr>
-            <a:lvl2pPr marL="742950" indent="-285750" eaLnBrk="0" hangingPunct="0">
-              <a:defRPr sz="4400">
-                <a:solidFill>
-                  <a:schemeClr val="tx1"/>
-                </a:solidFill>
-                <a:latin typeface="Arial" charset="0"/>
-                <a:ea typeface="Arial" charset="0"/>
-                <a:cs typeface="Arial" charset="0"/>
-              </a:defRPr>
-            </a:lvl2pPr>
-            <a:lvl3pPr marL="1143000" indent="-228600" eaLnBrk="0" hangingPunct="0">
-              <a:defRPr sz="4400">
-                <a:solidFill>
-                  <a:schemeClr val="tx1"/>
-                </a:solidFill>
-                <a:latin typeface="Arial" charset="0"/>
-                <a:ea typeface="Arial" charset="0"/>
-                <a:cs typeface="Arial" charset="0"/>
-              </a:defRPr>
-            </a:lvl3pPr>
-            <a:lvl4pPr marL="1600200" indent="-228600" eaLnBrk="0" hangingPunct="0">
-              <a:defRPr sz="4400">
-                <a:solidFill>
-                  <a:schemeClr val="tx1"/>
-                </a:solidFill>
-                <a:latin typeface="Arial" charset="0"/>
-                <a:ea typeface="Arial" charset="0"/>
-                <a:cs typeface="Arial" charset="0"/>
-              </a:defRPr>
-            </a:lvl4pPr>
-            <a:lvl5pPr marL="2057400" indent="-228600" eaLnBrk="0" hangingPunct="0">
-              <a:defRPr sz="4400">
-                <a:solidFill>
-                  <a:schemeClr val="tx1"/>
-                </a:solidFill>
-                <a:latin typeface="Arial" charset="0"/>
-                <a:ea typeface="Arial" charset="0"/>
-                <a:cs typeface="Arial" charset="0"/>
-              </a:defRPr>
-            </a:lvl5pPr>
-            <a:lvl6pPr marL="2514600" indent="-228600" eaLnBrk="0" fontAlgn="base" hangingPunct="0">
-              <a:spcBef>
-                <a:spcPct val="0"/>
-              </a:spcBef>
-              <a:spcAft>
-                <a:spcPct val="0"/>
-              </a:spcAft>
-              <a:defRPr sz="4400">
-                <a:solidFill>
-                  <a:schemeClr val="tx1"/>
-                </a:solidFill>
-                <a:latin typeface="Arial" charset="0"/>
-                <a:ea typeface="Arial" charset="0"/>
-                <a:cs typeface="Arial" charset="0"/>
-              </a:defRPr>
-            </a:lvl6pPr>
-            <a:lvl7pPr marL="2971800" indent="-228600" eaLnBrk="0" fontAlgn="base" hangingPunct="0">
-              <a:spcBef>
-                <a:spcPct val="0"/>
-              </a:spcBef>
-              <a:spcAft>
-                <a:spcPct val="0"/>
-              </a:spcAft>
-              <a:defRPr sz="4400">
-                <a:solidFill>
-                  <a:schemeClr val="tx1"/>
-                </a:solidFill>
-                <a:latin typeface="Arial" charset="0"/>
-                <a:ea typeface="Arial" charset="0"/>
-                <a:cs typeface="Arial" charset="0"/>
-              </a:defRPr>
-            </a:lvl7pPr>
-            <a:lvl8pPr marL="3429000" indent="-228600" eaLnBrk="0" fontAlgn="base" hangingPunct="0">
-              <a:spcBef>
-                <a:spcPct val="0"/>
-              </a:spcBef>
-              <a:spcAft>
-                <a:spcPct val="0"/>
-              </a:spcAft>
-              <a:defRPr sz="4400">
-                <a:solidFill>
-                  <a:schemeClr val="tx1"/>
-                </a:solidFill>
-                <a:latin typeface="Arial" charset="0"/>
-                <a:ea typeface="Arial" charset="0"/>
-                <a:cs typeface="Arial" charset="0"/>
-              </a:defRPr>
-            </a:lvl8pPr>
-            <a:lvl9pPr marL="3886200" indent="-228600" eaLnBrk="0" fontAlgn="base" hangingPunct="0">
-              <a:spcBef>
-                <a:spcPct val="0"/>
-              </a:spcBef>
-              <a:spcAft>
-                <a:spcPct val="0"/>
-              </a:spcAft>
-              <a:defRPr sz="4400">
-                <a:solidFill>
-                  <a:schemeClr val="tx1"/>
-                </a:solidFill>
-                <a:latin typeface="Arial" charset="0"/>
-                <a:ea typeface="Arial" charset="0"/>
-                <a:cs typeface="Arial" charset="0"/>
-              </a:defRPr>
-            </a:lvl9pPr>
-          </a:lstStyle>
-          <a:p>
-            <a:pPr algn="ctr" eaLnBrk="1" hangingPunct="1"/>
-            <a:r>
-              <a:rPr lang="en-US" sz="3200"/>
-              <a:t>Graph 7: Scientific Parent</a:t>
-            </a:r>
-          </a:p>
-        </p:txBody>
-      </p:sp>
-      <p:sp>
-        <p:nvSpPr>
-          <p:cNvPr id="3106" name="TextBox 59"/>
-          <p:cNvSpPr txBox="1">
-            <a:spLocks noChangeArrowheads="1"/>
-          </p:cNvSpPr>
-          <p:nvPr/>
-        </p:nvSpPr>
-        <p:spPr bwMode="auto">
-          <a:xfrm>
-            <a:off x="13084175" y="29444950"/>
-            <a:ext cx="12182475" cy="584776"/>
-          </a:xfrm>
-          <a:prstGeom prst="rect">
-            <a:avLst/>
-          </a:prstGeom>
-          <a:noFill/>
-          <a:ln>
-            <a:noFill/>
-          </a:ln>
-          <a:extLst>
-            <a:ext uri="{909E8E84-426E-40dd-AFC4-6F175D3DCCD1}">
-              <a14:hiddenFill xmlns:a14="http://schemas.microsoft.com/office/drawing/2010/main">
-                <a:solidFill>
-                  <a:srgbClr val="FFFFFF"/>
-                </a:solidFill>
-              </a14:hiddenFill>
-            </a:ext>
-            <a:ext uri="{91240B29-F687-4f45-9708-019B960494DF}">
-              <a14:hiddenLine xmlns:a14="http://schemas.microsoft.com/office/drawing/2010/main" w="9525">
-                <a:solidFill>
-                  <a:srgbClr val="000000"/>
-                </a:solidFill>
-                <a:miter lim="800000"/>
-                <a:headEnd/>
-                <a:tailEnd/>
-              </a14:hiddenLine>
-            </a:ext>
-          </a:extLst>
-        </p:spPr>
-        <p:txBody>
-          <a:bodyPr>
-            <a:spAutoFit/>
-          </a:bodyPr>
-          <a:lstStyle>
-            <a:lvl1pPr eaLnBrk="0" hangingPunct="0">
-              <a:defRPr sz="4400">
-                <a:solidFill>
-                  <a:schemeClr val="tx1"/>
-                </a:solidFill>
-                <a:latin typeface="Arial" charset="0"/>
-                <a:ea typeface="ＭＳ Ｐゴシック" charset="0"/>
-                <a:cs typeface="Arial" charset="0"/>
-              </a:defRPr>
-            </a:lvl1pPr>
-            <a:lvl2pPr marL="742950" indent="-285750" eaLnBrk="0" hangingPunct="0">
-              <a:defRPr sz="4400">
-                <a:solidFill>
-                  <a:schemeClr val="tx1"/>
-                </a:solidFill>
-                <a:latin typeface="Arial" charset="0"/>
-                <a:ea typeface="Arial" charset="0"/>
-                <a:cs typeface="Arial" charset="0"/>
-              </a:defRPr>
-            </a:lvl2pPr>
-            <a:lvl3pPr marL="1143000" indent="-228600" eaLnBrk="0" hangingPunct="0">
-              <a:defRPr sz="4400">
-                <a:solidFill>
-                  <a:schemeClr val="tx1"/>
-                </a:solidFill>
-                <a:latin typeface="Arial" charset="0"/>
-                <a:ea typeface="Arial" charset="0"/>
-                <a:cs typeface="Arial" charset="0"/>
-              </a:defRPr>
-            </a:lvl3pPr>
-            <a:lvl4pPr marL="1600200" indent="-228600" eaLnBrk="0" hangingPunct="0">
-              <a:defRPr sz="4400">
-                <a:solidFill>
-                  <a:schemeClr val="tx1"/>
-                </a:solidFill>
-                <a:latin typeface="Arial" charset="0"/>
-                <a:ea typeface="Arial" charset="0"/>
-                <a:cs typeface="Arial" charset="0"/>
-              </a:defRPr>
-            </a:lvl4pPr>
-            <a:lvl5pPr marL="2057400" indent="-228600" eaLnBrk="0" hangingPunct="0">
-              <a:defRPr sz="4400">
-                <a:solidFill>
-                  <a:schemeClr val="tx1"/>
-                </a:solidFill>
-                <a:latin typeface="Arial" charset="0"/>
-                <a:ea typeface="Arial" charset="0"/>
-                <a:cs typeface="Arial" charset="0"/>
-              </a:defRPr>
-            </a:lvl5pPr>
-            <a:lvl6pPr marL="2514600" indent="-228600" eaLnBrk="0" fontAlgn="base" hangingPunct="0">
-              <a:spcBef>
-                <a:spcPct val="0"/>
-              </a:spcBef>
-              <a:spcAft>
-                <a:spcPct val="0"/>
-              </a:spcAft>
-              <a:defRPr sz="4400">
-                <a:solidFill>
-                  <a:schemeClr val="tx1"/>
-                </a:solidFill>
-                <a:latin typeface="Arial" charset="0"/>
-                <a:ea typeface="Arial" charset="0"/>
-                <a:cs typeface="Arial" charset="0"/>
-              </a:defRPr>
-            </a:lvl6pPr>
-            <a:lvl7pPr marL="2971800" indent="-228600" eaLnBrk="0" fontAlgn="base" hangingPunct="0">
-              <a:spcBef>
-                <a:spcPct val="0"/>
-              </a:spcBef>
-              <a:spcAft>
-                <a:spcPct val="0"/>
-              </a:spcAft>
-              <a:defRPr sz="4400">
-                <a:solidFill>
-                  <a:schemeClr val="tx1"/>
-                </a:solidFill>
-                <a:latin typeface="Arial" charset="0"/>
-                <a:ea typeface="Arial" charset="0"/>
-                <a:cs typeface="Arial" charset="0"/>
-              </a:defRPr>
-            </a:lvl7pPr>
-            <a:lvl8pPr marL="3429000" indent="-228600" eaLnBrk="0" fontAlgn="base" hangingPunct="0">
-              <a:spcBef>
-                <a:spcPct val="0"/>
-              </a:spcBef>
-              <a:spcAft>
-                <a:spcPct val="0"/>
-              </a:spcAft>
-              <a:defRPr sz="4400">
-                <a:solidFill>
-                  <a:schemeClr val="tx1"/>
-                </a:solidFill>
-                <a:latin typeface="Arial" charset="0"/>
-                <a:ea typeface="Arial" charset="0"/>
-                <a:cs typeface="Arial" charset="0"/>
-              </a:defRPr>
-            </a:lvl8pPr>
-            <a:lvl9pPr marL="3886200" indent="-228600" eaLnBrk="0" fontAlgn="base" hangingPunct="0">
-              <a:spcBef>
-                <a:spcPct val="0"/>
-              </a:spcBef>
-              <a:spcAft>
-                <a:spcPct val="0"/>
-              </a:spcAft>
-              <a:defRPr sz="4400">
-                <a:solidFill>
-                  <a:schemeClr val="tx1"/>
-                </a:solidFill>
-                <a:latin typeface="Arial" charset="0"/>
-                <a:ea typeface="Arial" charset="0"/>
-                <a:cs typeface="Arial" charset="0"/>
-              </a:defRPr>
-            </a:lvl9pPr>
-          </a:lstStyle>
-          <a:p>
-            <a:pPr algn="ctr" eaLnBrk="1" hangingPunct="1"/>
-            <a:r>
-              <a:rPr lang="en-US" sz="3200" dirty="0"/>
-              <a:t>Graph 3</a:t>
-            </a:r>
-            <a:r>
-              <a:rPr lang="en-US" sz="3200" dirty="0" smtClean="0"/>
-              <a:t>:</a:t>
-            </a:r>
-            <a:endParaRPr lang="en-US" sz="3200" dirty="0"/>
-          </a:p>
-        </p:txBody>
-      </p:sp>
-      <p:sp>
-        <p:nvSpPr>
-          <p:cNvPr id="3107" name="TextBox 60"/>
-          <p:cNvSpPr txBox="1">
-            <a:spLocks noChangeArrowheads="1"/>
-          </p:cNvSpPr>
-          <p:nvPr/>
-        </p:nvSpPr>
-        <p:spPr bwMode="auto">
-          <a:xfrm>
-            <a:off x="19626263" y="18426113"/>
-            <a:ext cx="5189537" cy="584776"/>
-          </a:xfrm>
-          <a:prstGeom prst="rect">
-            <a:avLst/>
-          </a:prstGeom>
-          <a:noFill/>
-          <a:ln>
-            <a:noFill/>
-          </a:ln>
-          <a:extLst>
-            <a:ext uri="{909E8E84-426E-40dd-AFC4-6F175D3DCCD1}">
-              <a14:hiddenFill xmlns:a14="http://schemas.microsoft.com/office/drawing/2010/main">
-                <a:solidFill>
-                  <a:srgbClr val="FFFFFF"/>
-                </a:solidFill>
-              </a14:hiddenFill>
-            </a:ext>
-            <a:ext uri="{91240B29-F687-4f45-9708-019B960494DF}">
-              <a14:hiddenLine xmlns:a14="http://schemas.microsoft.com/office/drawing/2010/main" w="9525">
-                <a:solidFill>
-                  <a:srgbClr val="000000"/>
-                </a:solidFill>
-                <a:miter lim="800000"/>
-                <a:headEnd/>
-                <a:tailEnd/>
-              </a14:hiddenLine>
-            </a:ext>
-          </a:extLst>
-        </p:spPr>
-        <p:txBody>
-          <a:bodyPr>
-            <a:spAutoFit/>
-          </a:bodyPr>
-          <a:lstStyle>
-            <a:lvl1pPr eaLnBrk="0" hangingPunct="0">
-              <a:defRPr sz="4400">
-                <a:solidFill>
-                  <a:schemeClr val="tx1"/>
-                </a:solidFill>
-                <a:latin typeface="Arial" charset="0"/>
-                <a:ea typeface="ＭＳ Ｐゴシック" charset="0"/>
-                <a:cs typeface="Arial" charset="0"/>
-              </a:defRPr>
-            </a:lvl1pPr>
-            <a:lvl2pPr marL="742950" indent="-285750" eaLnBrk="0" hangingPunct="0">
-              <a:defRPr sz="4400">
-                <a:solidFill>
-                  <a:schemeClr val="tx1"/>
-                </a:solidFill>
-                <a:latin typeface="Arial" charset="0"/>
-                <a:ea typeface="Arial" charset="0"/>
-                <a:cs typeface="Arial" charset="0"/>
-              </a:defRPr>
-            </a:lvl2pPr>
-            <a:lvl3pPr marL="1143000" indent="-228600" eaLnBrk="0" hangingPunct="0">
-              <a:defRPr sz="4400">
-                <a:solidFill>
-                  <a:schemeClr val="tx1"/>
-                </a:solidFill>
-                <a:latin typeface="Arial" charset="0"/>
-                <a:ea typeface="Arial" charset="0"/>
-                <a:cs typeface="Arial" charset="0"/>
-              </a:defRPr>
-            </a:lvl3pPr>
-            <a:lvl4pPr marL="1600200" indent="-228600" eaLnBrk="0" hangingPunct="0">
-              <a:defRPr sz="4400">
-                <a:solidFill>
-                  <a:schemeClr val="tx1"/>
-                </a:solidFill>
-                <a:latin typeface="Arial" charset="0"/>
-                <a:ea typeface="Arial" charset="0"/>
-                <a:cs typeface="Arial" charset="0"/>
-              </a:defRPr>
-            </a:lvl4pPr>
-            <a:lvl5pPr marL="2057400" indent="-228600" eaLnBrk="0" hangingPunct="0">
-              <a:defRPr sz="4400">
-                <a:solidFill>
-                  <a:schemeClr val="tx1"/>
-                </a:solidFill>
-                <a:latin typeface="Arial" charset="0"/>
-                <a:ea typeface="Arial" charset="0"/>
-                <a:cs typeface="Arial" charset="0"/>
-              </a:defRPr>
-            </a:lvl5pPr>
-            <a:lvl6pPr marL="2514600" indent="-228600" eaLnBrk="0" fontAlgn="base" hangingPunct="0">
-              <a:spcBef>
-                <a:spcPct val="0"/>
-              </a:spcBef>
-              <a:spcAft>
-                <a:spcPct val="0"/>
-              </a:spcAft>
-              <a:defRPr sz="4400">
-                <a:solidFill>
-                  <a:schemeClr val="tx1"/>
-                </a:solidFill>
-                <a:latin typeface="Arial" charset="0"/>
-                <a:ea typeface="Arial" charset="0"/>
-                <a:cs typeface="Arial" charset="0"/>
-              </a:defRPr>
-            </a:lvl6pPr>
-            <a:lvl7pPr marL="2971800" indent="-228600" eaLnBrk="0" fontAlgn="base" hangingPunct="0">
-              <a:spcBef>
-                <a:spcPct val="0"/>
-              </a:spcBef>
-              <a:spcAft>
-                <a:spcPct val="0"/>
-              </a:spcAft>
-              <a:defRPr sz="4400">
-                <a:solidFill>
-                  <a:schemeClr val="tx1"/>
-                </a:solidFill>
-                <a:latin typeface="Arial" charset="0"/>
-                <a:ea typeface="Arial" charset="0"/>
-                <a:cs typeface="Arial" charset="0"/>
-              </a:defRPr>
-            </a:lvl7pPr>
-            <a:lvl8pPr marL="3429000" indent="-228600" eaLnBrk="0" fontAlgn="base" hangingPunct="0">
-              <a:spcBef>
-                <a:spcPct val="0"/>
-              </a:spcBef>
-              <a:spcAft>
-                <a:spcPct val="0"/>
-              </a:spcAft>
-              <a:defRPr sz="4400">
-                <a:solidFill>
-                  <a:schemeClr val="tx1"/>
-                </a:solidFill>
-                <a:latin typeface="Arial" charset="0"/>
-                <a:ea typeface="Arial" charset="0"/>
-                <a:cs typeface="Arial" charset="0"/>
-              </a:defRPr>
-            </a:lvl8pPr>
-            <a:lvl9pPr marL="3886200" indent="-228600" eaLnBrk="0" fontAlgn="base" hangingPunct="0">
-              <a:spcBef>
-                <a:spcPct val="0"/>
-              </a:spcBef>
-              <a:spcAft>
-                <a:spcPct val="0"/>
-              </a:spcAft>
-              <a:defRPr sz="4400">
-                <a:solidFill>
-                  <a:schemeClr val="tx1"/>
-                </a:solidFill>
-                <a:latin typeface="Arial" charset="0"/>
-                <a:ea typeface="Arial" charset="0"/>
-                <a:cs typeface="Arial" charset="0"/>
-              </a:defRPr>
-            </a:lvl9pPr>
-          </a:lstStyle>
-          <a:p>
-            <a:pPr algn="ctr" eaLnBrk="1" hangingPunct="1"/>
-            <a:r>
-              <a:rPr lang="en-US" sz="3200" dirty="0"/>
-              <a:t>Graph 2</a:t>
-            </a:r>
-            <a:r>
-              <a:rPr lang="en-US" sz="3200" dirty="0" smtClean="0"/>
-              <a:t>:</a:t>
-            </a:r>
-            <a:endParaRPr lang="en-US" sz="3200" dirty="0"/>
-          </a:p>
-        </p:txBody>
-      </p:sp>
-      <p:sp>
-        <p:nvSpPr>
-          <p:cNvPr id="3108" name="TextBox 61"/>
-          <p:cNvSpPr txBox="1">
-            <a:spLocks noChangeArrowheads="1"/>
-          </p:cNvSpPr>
-          <p:nvPr/>
-        </p:nvSpPr>
-        <p:spPr bwMode="auto">
-          <a:xfrm>
-            <a:off x="25765125" y="16790988"/>
-            <a:ext cx="12317413" cy="584200"/>
-          </a:xfrm>
-          <a:prstGeom prst="rect">
-            <a:avLst/>
-          </a:prstGeom>
-          <a:noFill/>
-          <a:ln>
-            <a:noFill/>
-          </a:ln>
-          <a:extLst>
-            <a:ext uri="{909E8E84-426E-40dd-AFC4-6F175D3DCCD1}">
-              <a14:hiddenFill xmlns:a14="http://schemas.microsoft.com/office/drawing/2010/main">
-                <a:solidFill>
-                  <a:srgbClr val="FFFFFF"/>
-                </a:solidFill>
-              </a14:hiddenFill>
-            </a:ext>
-            <a:ext uri="{91240B29-F687-4f45-9708-019B960494DF}">
-              <a14:hiddenLine xmlns:a14="http://schemas.microsoft.com/office/drawing/2010/main" w="9525">
-                <a:solidFill>
-                  <a:srgbClr val="000000"/>
-                </a:solidFill>
-                <a:miter lim="800000"/>
-                <a:headEnd/>
-                <a:tailEnd/>
-              </a14:hiddenLine>
-            </a:ext>
-          </a:extLst>
-        </p:spPr>
-        <p:txBody>
-          <a:bodyPr>
-            <a:spAutoFit/>
-          </a:bodyPr>
-          <a:lstStyle>
-            <a:lvl1pPr eaLnBrk="0" hangingPunct="0">
-              <a:defRPr sz="4400">
-                <a:solidFill>
-                  <a:schemeClr val="tx1"/>
-                </a:solidFill>
-                <a:latin typeface="Arial" charset="0"/>
-                <a:ea typeface="ＭＳ Ｐゴシック" charset="0"/>
-                <a:cs typeface="Arial" charset="0"/>
-              </a:defRPr>
-            </a:lvl1pPr>
-            <a:lvl2pPr marL="742950" indent="-285750" eaLnBrk="0" hangingPunct="0">
-              <a:defRPr sz="4400">
-                <a:solidFill>
-                  <a:schemeClr val="tx1"/>
-                </a:solidFill>
-                <a:latin typeface="Arial" charset="0"/>
-                <a:ea typeface="Arial" charset="0"/>
-                <a:cs typeface="Arial" charset="0"/>
-              </a:defRPr>
-            </a:lvl2pPr>
-            <a:lvl3pPr marL="1143000" indent="-228600" eaLnBrk="0" hangingPunct="0">
-              <a:defRPr sz="4400">
-                <a:solidFill>
-                  <a:schemeClr val="tx1"/>
-                </a:solidFill>
-                <a:latin typeface="Arial" charset="0"/>
-                <a:ea typeface="Arial" charset="0"/>
-                <a:cs typeface="Arial" charset="0"/>
-              </a:defRPr>
-            </a:lvl3pPr>
-            <a:lvl4pPr marL="1600200" indent="-228600" eaLnBrk="0" hangingPunct="0">
-              <a:defRPr sz="4400">
-                <a:solidFill>
-                  <a:schemeClr val="tx1"/>
-                </a:solidFill>
-                <a:latin typeface="Arial" charset="0"/>
-                <a:ea typeface="Arial" charset="0"/>
-                <a:cs typeface="Arial" charset="0"/>
-              </a:defRPr>
-            </a:lvl4pPr>
-            <a:lvl5pPr marL="2057400" indent="-228600" eaLnBrk="0" hangingPunct="0">
-              <a:defRPr sz="4400">
-                <a:solidFill>
-                  <a:schemeClr val="tx1"/>
-                </a:solidFill>
-                <a:latin typeface="Arial" charset="0"/>
-                <a:ea typeface="Arial" charset="0"/>
-                <a:cs typeface="Arial" charset="0"/>
-              </a:defRPr>
-            </a:lvl5pPr>
-            <a:lvl6pPr marL="2514600" indent="-228600" eaLnBrk="0" fontAlgn="base" hangingPunct="0">
-              <a:spcBef>
-                <a:spcPct val="0"/>
-              </a:spcBef>
-              <a:spcAft>
-                <a:spcPct val="0"/>
-              </a:spcAft>
-              <a:defRPr sz="4400">
-                <a:solidFill>
-                  <a:schemeClr val="tx1"/>
-                </a:solidFill>
-                <a:latin typeface="Arial" charset="0"/>
-                <a:ea typeface="Arial" charset="0"/>
-                <a:cs typeface="Arial" charset="0"/>
-              </a:defRPr>
-            </a:lvl6pPr>
-            <a:lvl7pPr marL="2971800" indent="-228600" eaLnBrk="0" fontAlgn="base" hangingPunct="0">
-              <a:spcBef>
-                <a:spcPct val="0"/>
-              </a:spcBef>
-              <a:spcAft>
-                <a:spcPct val="0"/>
-              </a:spcAft>
-              <a:defRPr sz="4400">
-                <a:solidFill>
-                  <a:schemeClr val="tx1"/>
-                </a:solidFill>
-                <a:latin typeface="Arial" charset="0"/>
-                <a:ea typeface="Arial" charset="0"/>
-                <a:cs typeface="Arial" charset="0"/>
-              </a:defRPr>
-            </a:lvl7pPr>
-            <a:lvl8pPr marL="3429000" indent="-228600" eaLnBrk="0" fontAlgn="base" hangingPunct="0">
-              <a:spcBef>
-                <a:spcPct val="0"/>
-              </a:spcBef>
-              <a:spcAft>
-                <a:spcPct val="0"/>
-              </a:spcAft>
-              <a:defRPr sz="4400">
-                <a:solidFill>
-                  <a:schemeClr val="tx1"/>
-                </a:solidFill>
-                <a:latin typeface="Arial" charset="0"/>
-                <a:ea typeface="Arial" charset="0"/>
-                <a:cs typeface="Arial" charset="0"/>
-              </a:defRPr>
-            </a:lvl8pPr>
-            <a:lvl9pPr marL="3886200" indent="-228600" eaLnBrk="0" fontAlgn="base" hangingPunct="0">
-              <a:spcBef>
-                <a:spcPct val="0"/>
-              </a:spcBef>
-              <a:spcAft>
-                <a:spcPct val="0"/>
-              </a:spcAft>
-              <a:defRPr sz="4400">
-                <a:solidFill>
-                  <a:schemeClr val="tx1"/>
-                </a:solidFill>
-                <a:latin typeface="Arial" charset="0"/>
-                <a:ea typeface="Arial" charset="0"/>
-                <a:cs typeface="Arial" charset="0"/>
-              </a:defRPr>
-            </a:lvl9pPr>
-          </a:lstStyle>
-          <a:p>
-            <a:pPr algn="ctr" eaLnBrk="1" hangingPunct="1"/>
-            <a:r>
-              <a:rPr lang="en-US" sz="3200"/>
-              <a:t>Table 1: Full Results with Inferential Statistics</a:t>
             </a:r>
           </a:p>
         </p:txBody>
@@ -9582,31 +7834,18 @@
           </a:p>
         </p:txBody>
       </p:sp>
-      <p:pic>
-        <p:nvPicPr>
-          <p:cNvPr id="3110" name="Picture 39" descr="22.jpg"/>
-          <p:cNvPicPr>
-            <a:picLocks noChangeAspect="1"/>
-          </p:cNvPicPr>
+      <p:sp>
+        <p:nvSpPr>
+          <p:cNvPr id="41" name="Text Box 148"/>
+          <p:cNvSpPr txBox="1">
+            <a:spLocks noChangeArrowheads="1"/>
+          </p:cNvSpPr>
           <p:nvPr/>
-        </p:nvPicPr>
-        <p:blipFill>
-          <a:blip r:embed="rId9">
-            <a:extLst>
-              <a:ext uri="{28A0092B-C50C-407E-A947-70E740481C1C}">
-                <a14:useLocalDpi xmlns:a14="http://schemas.microsoft.com/office/drawing/2010/main" val="0"/>
-              </a:ext>
-            </a:extLst>
-          </a:blip>
-          <a:srcRect/>
-          <a:stretch>
-            <a:fillRect/>
-          </a:stretch>
-        </p:blipFill>
+        </p:nvSpPr>
         <p:spPr bwMode="auto">
           <a:xfrm>
-            <a:off x="26025475" y="17556163"/>
-            <a:ext cx="11687175" cy="11649075"/>
+            <a:off x="3072691" y="23802929"/>
+            <a:ext cx="9218074" cy="2800767"/>
           </a:xfrm>
           <a:prstGeom prst="rect">
             <a:avLst/>
@@ -9635,103 +7874,8 @@
             </a:ext>
           </a:extLst>
         </p:spPr>
-      </p:pic>
-      <p:pic>
-        <p:nvPicPr>
-          <p:cNvPr id="3111" name="Picture 40" descr="25.jpg"/>
-          <p:cNvPicPr>
-            <a:picLocks noChangeAspect="1"/>
-          </p:cNvPicPr>
-          <p:nvPr/>
-        </p:nvPicPr>
-        <p:blipFill>
-          <a:blip r:embed="rId10">
-            <a:extLst>
-              <a:ext uri="{28A0092B-C50C-407E-A947-70E740481C1C}">
-                <a14:useLocalDpi xmlns:a14="http://schemas.microsoft.com/office/drawing/2010/main" val="0"/>
-              </a:ext>
-            </a:extLst>
-          </a:blip>
-          <a:srcRect/>
-          <a:stretch>
-            <a:fillRect/>
-          </a:stretch>
-        </p:blipFill>
-        <p:spPr bwMode="auto">
-          <a:xfrm>
-            <a:off x="30437138" y="29437013"/>
-            <a:ext cx="3101975" cy="1176337"/>
-          </a:xfrm>
-          <a:prstGeom prst="rect">
-            <a:avLst/>
-          </a:prstGeom>
-          <a:noFill/>
-          <a:ln>
-            <a:noFill/>
-          </a:ln>
-          <a:extLst>
-            <a:ext uri="{909E8E84-426E-40dd-AFC4-6F175D3DCCD1}">
-              <a14:hiddenFill xmlns:a14="http://schemas.microsoft.com/office/drawing/2010/main">
-                <a:solidFill>
-                  <a:srgbClr val="FFFFFF"/>
-                </a:solidFill>
-              </a14:hiddenFill>
-            </a:ext>
-            <a:ext uri="{91240B29-F687-4f45-9708-019B960494DF}">
-              <a14:hiddenLine xmlns:a14="http://schemas.microsoft.com/office/drawing/2010/main" w="9525">
-                <a:solidFill>
-                  <a:srgbClr val="000000"/>
-                </a:solidFill>
-                <a:miter lim="800000"/>
-                <a:headEnd/>
-                <a:tailEnd/>
-              </a14:hiddenLine>
-            </a:ext>
-          </a:extLst>
-        </p:spPr>
-      </p:pic>
-      <p:sp>
-        <p:nvSpPr>
-          <p:cNvPr id="41" name="Text Box 148"/>
-          <p:cNvSpPr txBox="1">
-            <a:spLocks noChangeArrowheads="1"/>
-          </p:cNvSpPr>
-          <p:nvPr/>
-        </p:nvSpPr>
-        <p:spPr bwMode="auto">
-          <a:xfrm>
-            <a:off x="3613150" y="24499402"/>
-            <a:ext cx="8108950" cy="954107"/>
-          </a:xfrm>
-          <a:prstGeom prst="rect">
-            <a:avLst/>
-          </a:prstGeom>
-          <a:noFill/>
-          <a:ln>
-            <a:noFill/>
-          </a:ln>
-          <a:extLst>
-            <a:ext uri="{909E8E84-426E-40dd-AFC4-6F175D3DCCD1}">
-              <a14:hiddenFill xmlns:a14="http://schemas.microsoft.com/office/drawing/2010/main">
-                <a:solidFill>
-                  <a:srgbClr val="FFFFFF"/>
-                </a:solidFill>
-              </a14:hiddenFill>
-            </a:ext>
-            <a:ext uri="{91240B29-F687-4f45-9708-019B960494DF}">
-              <a14:hiddenLine xmlns:a14="http://schemas.microsoft.com/office/drawing/2010/main" w="9525">
-                <a:solidFill>
-                  <a:srgbClr val="000000"/>
-                </a:solidFill>
-                <a:miter lim="800000"/>
-                <a:headEnd/>
-                <a:tailEnd/>
-              </a14:hiddenLine>
-            </a:ext>
-          </a:extLst>
-        </p:spPr>
         <p:txBody>
-          <a:bodyPr>
+          <a:bodyPr wrap="square">
             <a:spAutoFit/>
           </a:bodyPr>
           <a:lstStyle>
@@ -9853,13 +7997,10 @@
           <a:p>
             <a:pPr eaLnBrk="1" hangingPunct="1"/>
             <a:r>
-              <a:rPr lang="en-US" sz="2800" dirty="0"/>
-              <a:t/>
-            </a:r>
-            <a:br>
-              <a:rPr lang="en-US" sz="2800" dirty="0"/>
-            </a:br>
-            <a:endParaRPr lang="en-US" sz="2800" dirty="0"/>
+              <a:rPr lang="en-US" dirty="0" smtClean="0"/>
+              <a:t>A Raspberry Pi using a Low Energy Bluetooth USB nub will be able to detect nearby devices from a distance no greater than 40 feet.</a:t>
+            </a:r>
+            <a:endParaRPr lang="en-US" dirty="0"/>
           </a:p>
         </p:txBody>
       </p:sp>
@@ -10046,8 +8187,8 @@
         </p:nvSpPr>
         <p:spPr bwMode="auto">
           <a:xfrm>
-            <a:off x="15084531" y="6432178"/>
-            <a:ext cx="8108950" cy="954107"/>
+            <a:off x="13486731" y="5940551"/>
+            <a:ext cx="11258676" cy="10926066"/>
           </a:xfrm>
           <a:prstGeom prst="rect">
             <a:avLst/>
@@ -10077,7 +8218,7 @@
           </a:extLst>
         </p:spPr>
         <p:txBody>
-          <a:bodyPr>
+          <a:bodyPr wrap="square">
             <a:spAutoFit/>
           </a:bodyPr>
           <a:lstStyle>
@@ -10199,13 +8340,18 @@
           <a:p>
             <a:pPr eaLnBrk="1" hangingPunct="1"/>
             <a:r>
-              <a:rPr lang="en-US" sz="2800" dirty="0"/>
-              <a:t/>
-            </a:r>
-            <a:br>
-              <a:rPr lang="en-US" sz="2800" dirty="0"/>
-            </a:br>
-            <a:endParaRPr lang="en-US" sz="2800" dirty="0"/>
+              <a:rPr lang="en-US" dirty="0" smtClean="0"/>
+              <a:t>The first step in determining the practical range was to establish a baseline and determine whether the direction of the Bluetooth nub mattered. These two were tested outdoors on flat ground. Then the Raspberry Pi was raised to a height of 4 feet, and the experiments were repeated using the ideal orientation of the nub. Placing the Raspberry Pi back on the ground, motion tests were performed by moving in a straight line with the </a:t>
+            </a:r>
+            <a:r>
+              <a:rPr lang="en-US" dirty="0" err="1" smtClean="0"/>
+              <a:t>cosest</a:t>
+            </a:r>
+            <a:r>
+              <a:rPr lang="en-US" dirty="0" smtClean="0"/>
+              <a:t> point being the measurement. Lastly, the first test was repeated inside, except with a wall placed between the two devices. It was tested moving each device away from the wall as well as moving both devices.</a:t>
+            </a:r>
+            <a:endParaRPr lang="en-US" dirty="0"/>
           </a:p>
         </p:txBody>
       </p:sp>
@@ -10219,8 +8365,8 @@
         </p:nvSpPr>
         <p:spPr bwMode="auto">
           <a:xfrm>
-            <a:off x="39461215" y="6473147"/>
-            <a:ext cx="8108950" cy="954107"/>
+            <a:off x="39133462" y="6227332"/>
+            <a:ext cx="9415059" cy="14311609"/>
           </a:xfrm>
           <a:prstGeom prst="rect">
             <a:avLst/>
@@ -10250,7 +8396,7 @@
           </a:extLst>
         </p:spPr>
         <p:txBody>
-          <a:bodyPr>
+          <a:bodyPr wrap="square">
             <a:spAutoFit/>
           </a:bodyPr>
           <a:lstStyle>
@@ -10372,13 +8518,32 @@
           <a:p>
             <a:pPr eaLnBrk="1" hangingPunct="1"/>
             <a:r>
-              <a:rPr lang="en-US" sz="2800" dirty="0"/>
-              <a:t/>
-            </a:r>
-            <a:br>
-              <a:rPr lang="en-US" sz="2800" dirty="0"/>
-            </a:br>
-            <a:endParaRPr lang="en-US" sz="2800" dirty="0"/>
+              <a:rPr lang="en-US" dirty="0" smtClean="0"/>
+              <a:t>When first determining the ideal orientation of the Bluetooth nub, it appeared as though 0o was ideal. Although 0o was the strongest, 180o turned out to be most consistent over the longest distance, making it the ideal orientation.</a:t>
+            </a:r>
+          </a:p>
+          <a:p>
+            <a:pPr eaLnBrk="1" hangingPunct="1"/>
+            <a:endParaRPr lang="en-US" dirty="0"/>
+          </a:p>
+          <a:p>
+            <a:pPr eaLnBrk="1" hangingPunct="1"/>
+            <a:r>
+              <a:rPr lang="en-US" dirty="0" smtClean="0"/>
+              <a:t>When comparing the height of 0 feet and 4 feet, it became very apparent that a height of 4 feet greatly increased the range. A distance of 80 feet was the farthest that the available setup could test.</a:t>
+            </a:r>
+          </a:p>
+          <a:p>
+            <a:pPr eaLnBrk="1" hangingPunct="1"/>
+            <a:endParaRPr lang="en-US" dirty="0"/>
+          </a:p>
+          <a:p>
+            <a:pPr eaLnBrk="1" hangingPunct="1"/>
+            <a:r>
+              <a:rPr lang="en-US" dirty="0" smtClean="0"/>
+              <a:t>With a wall placed between the two devices, very little difference was seen through 15 feet, but at distances greater than 15 feet, the signal was strongest by far when neither device was next to the wall.</a:t>
+            </a:r>
+            <a:endParaRPr lang="en-US" dirty="0"/>
           </a:p>
         </p:txBody>
       </p:sp>
@@ -10564,7 +8729,7 @@
         <p:spPr>
           <a:xfrm>
             <a:off x="3091895" y="6373440"/>
-            <a:ext cx="9198870" cy="8217633"/>
+            <a:ext cx="9198870" cy="7540525"/>
           </a:xfrm>
           <a:prstGeom prst="rect">
             <a:avLst/>
@@ -10586,7 +8751,15 @@
             </a:r>
             <a:r>
               <a:rPr lang="en-US" dirty="0"/>
-              <a:t> to drones to technology-infused cars.  This multitude of technological advances is becoming so ingrained into our daily lives that our world requires a way to seamlessly and wirelessly interconnect them. Bluetooth Low Energy may just be that system, but its practical range remains uncertain in many situations.</a:t>
+              <a:t> to drones to technology-infused cars.  This multitude of technological advances is becoming so ingrained into our daily lives that our world requires a way to </a:t>
+            </a:r>
+            <a:r>
+              <a:rPr lang="en-US" dirty="0" smtClean="0"/>
+              <a:t>wirelessly </a:t>
+            </a:r>
+            <a:r>
+              <a:rPr lang="en-US" dirty="0"/>
+              <a:t>interconnect them. Bluetooth Low Energy may just be that system, but its practical range remains uncertain in many situations.</a:t>
             </a:r>
             <a:r>
               <a:rPr lang="en-US" dirty="0" smtClean="0">
@@ -10606,8 +8779,8 @@
         </p:nvSpPr>
         <p:spPr>
           <a:xfrm>
-            <a:off x="38633972" y="21848822"/>
-            <a:ext cx="10201335" cy="8894742"/>
+            <a:off x="39125603" y="22504326"/>
+            <a:ext cx="9422920" cy="8217633"/>
           </a:xfrm>
           <a:prstGeom prst="rect">
             <a:avLst/>
@@ -10620,22 +8793,405 @@
           <a:lstStyle/>
           <a:p>
             <a:r>
+              <a:rPr lang="en-US" dirty="0" smtClean="0"/>
+              <a:t>The goal </a:t>
+            </a:r>
+            <a:r>
               <a:rPr lang="en-US" dirty="0"/>
-              <a:t>Our goal in this experiment was to determine the ideal setup for consistently detecting an iPhone using Bluetooth Low Energy and determine its range. Based off of the results of the first four experiments, the most consistent orientation of the Raspberry Pi is 180</a:t>
-            </a:r>
-            <a:r>
-              <a:rPr lang="en-US" baseline="30000" dirty="0"/>
+              <a:t>in this experiment was to determine the ideal setup for consistently detecting an iPhone using Bluetooth Low Energy and determine its range. </a:t>
+            </a:r>
+            <a:r>
+              <a:rPr lang="en-US" dirty="0" smtClean="0"/>
+              <a:t>When the results from all of the tests are combined, it was determined that the ideal indoor setup consisted of placing the Raspberry Pi at a height of 4 feet away from a wall with the Bluetooth nub facing away from the general location of the iPhone.</a:t>
+            </a:r>
+            <a:endParaRPr lang="en-US" dirty="0"/>
+          </a:p>
+        </p:txBody>
+      </p:sp>
+      <p:pic>
+        <p:nvPicPr>
+          <p:cNvPr id="6" name="Picture 5" descr="bluetooth-4-logo.jpg"/>
+          <p:cNvPicPr>
+            <a:picLocks noChangeAspect="1"/>
+          </p:cNvPicPr>
+          <p:nvPr/>
+        </p:nvPicPr>
+        <p:blipFill>
+          <a:blip r:embed="rId2">
+            <a:extLst>
+              <a:ext uri="{28A0092B-C50C-407E-A947-70E740481C1C}">
+                <a14:useLocalDpi xmlns:a14="http://schemas.microsoft.com/office/drawing/2010/main" val="0"/>
+              </a:ext>
+            </a:extLst>
+          </a:blip>
+          <a:stretch>
+            <a:fillRect/>
+          </a:stretch>
+        </p:blipFill>
+        <p:spPr>
+          <a:xfrm>
+            <a:off x="5688705" y="26867763"/>
+            <a:ext cx="6731000" cy="3784600"/>
+          </a:xfrm>
+          <a:prstGeom prst="rect">
+            <a:avLst/>
+          </a:prstGeom>
+        </p:spPr>
+      </p:pic>
+      <p:pic>
+        <p:nvPicPr>
+          <p:cNvPr id="7" name="Picture 6" descr="DistanceAt0ftWithRotation.jpg"/>
+          <p:cNvPicPr>
+            <a:picLocks noChangeAspect="1"/>
+          </p:cNvPicPr>
+          <p:nvPr/>
+        </p:nvPicPr>
+        <p:blipFill>
+          <a:blip r:embed="rId3">
+            <a:extLst>
+              <a:ext uri="{28A0092B-C50C-407E-A947-70E740481C1C}">
+                <a14:useLocalDpi xmlns:a14="http://schemas.microsoft.com/office/drawing/2010/main" val="0"/>
+              </a:ext>
+            </a:extLst>
+          </a:blip>
+          <a:stretch>
+            <a:fillRect/>
+          </a:stretch>
+        </p:blipFill>
+        <p:spPr>
+          <a:xfrm>
+            <a:off x="17397290" y="17985295"/>
+            <a:ext cx="7798775" cy="6391127"/>
+          </a:xfrm>
+          <a:prstGeom prst="rect">
+            <a:avLst/>
+          </a:prstGeom>
+        </p:spPr>
+      </p:pic>
+      <p:pic>
+        <p:nvPicPr>
+          <p:cNvPr id="8" name="Picture 7" descr="RelativeRotationGraph.jpg"/>
+          <p:cNvPicPr>
+            <a:picLocks noChangeAspect="1"/>
+          </p:cNvPicPr>
+          <p:nvPr/>
+        </p:nvPicPr>
+        <p:blipFill>
+          <a:blip r:embed="rId4">
+            <a:extLst>
+              <a:ext uri="{28A0092B-C50C-407E-A947-70E740481C1C}">
+                <a14:useLocalDpi xmlns:a14="http://schemas.microsoft.com/office/drawing/2010/main" val="0"/>
+              </a:ext>
+            </a:extLst>
+          </a:blip>
+          <a:stretch>
+            <a:fillRect/>
+          </a:stretch>
+        </p:blipFill>
+        <p:spPr>
+          <a:xfrm>
+            <a:off x="13233058" y="24676624"/>
+            <a:ext cx="7292520" cy="5927043"/>
+          </a:xfrm>
+          <a:prstGeom prst="rect">
+            <a:avLst/>
+          </a:prstGeom>
+        </p:spPr>
+      </p:pic>
+      <p:pic>
+        <p:nvPicPr>
+          <p:cNvPr id="9" name="Picture 8" descr="DistanceAt4ft.jpg"/>
+          <p:cNvPicPr>
+            <a:picLocks noChangeAspect="1"/>
+          </p:cNvPicPr>
+          <p:nvPr/>
+        </p:nvPicPr>
+        <p:blipFill>
+          <a:blip r:embed="rId5">
+            <a:extLst>
+              <a:ext uri="{28A0092B-C50C-407E-A947-70E740481C1C}">
+                <a14:useLocalDpi xmlns:a14="http://schemas.microsoft.com/office/drawing/2010/main" val="0"/>
+              </a:ext>
+            </a:extLst>
+          </a:blip>
+          <a:stretch>
+            <a:fillRect/>
+          </a:stretch>
+        </p:blipFill>
+        <p:spPr>
+          <a:xfrm>
+            <a:off x="26139578" y="5701484"/>
+            <a:ext cx="9216856" cy="6338459"/>
+          </a:xfrm>
+          <a:prstGeom prst="rect">
+            <a:avLst/>
+          </a:prstGeom>
+        </p:spPr>
+      </p:pic>
+      <p:pic>
+        <p:nvPicPr>
+          <p:cNvPr id="10" name="Picture 9" descr="Motion Trials.jpg"/>
+          <p:cNvPicPr>
+            <a:picLocks noChangeAspect="1"/>
+          </p:cNvPicPr>
+          <p:nvPr/>
+        </p:nvPicPr>
+        <p:blipFill>
+          <a:blip r:embed="rId6">
+            <a:extLst>
+              <a:ext uri="{28A0092B-C50C-407E-A947-70E740481C1C}">
+                <a14:useLocalDpi xmlns:a14="http://schemas.microsoft.com/office/drawing/2010/main" val="0"/>
+              </a:ext>
+            </a:extLst>
+          </a:blip>
+          <a:stretch>
+            <a:fillRect/>
+          </a:stretch>
+        </p:blipFill>
+        <p:spPr>
+          <a:xfrm>
+            <a:off x="28227790" y="13886293"/>
+            <a:ext cx="9761440" cy="5983557"/>
+          </a:xfrm>
+          <a:prstGeom prst="rect">
+            <a:avLst/>
+          </a:prstGeom>
+        </p:spPr>
+      </p:pic>
+      <p:sp>
+        <p:nvSpPr>
+          <p:cNvPr id="12" name="TextBox 11"/>
+          <p:cNvSpPr txBox="1"/>
+          <p:nvPr/>
+        </p:nvSpPr>
+        <p:spPr>
+          <a:xfrm>
+            <a:off x="13192086" y="18067242"/>
+            <a:ext cx="4096924" cy="6186308"/>
+          </a:xfrm>
+          <a:prstGeom prst="rect">
+            <a:avLst/>
+          </a:prstGeom>
+          <a:noFill/>
+        </p:spPr>
+        <p:txBody>
+          <a:bodyPr wrap="square" rtlCol="0">
+            <a:spAutoFit/>
+          </a:bodyPr>
+          <a:lstStyle/>
+          <a:p>
+            <a:r>
+              <a:rPr lang="en-US" dirty="0" smtClean="0"/>
+              <a:t>Graph 1:</a:t>
+            </a:r>
+          </a:p>
+          <a:p>
+            <a:r>
+              <a:rPr lang="en-US" dirty="0" smtClean="0"/>
+              <a:t>Distance tests at a height of 0 feet, with rotation trials.</a:t>
+            </a:r>
+          </a:p>
+          <a:p>
+            <a:r>
+              <a:rPr lang="en-US" dirty="0" smtClean="0"/>
+              <a:t>Trial A = 0</a:t>
+            </a:r>
+            <a:r>
+              <a:rPr lang="en-US" baseline="30000" dirty="0" smtClean="0"/>
               <a:t>o</a:t>
             </a:r>
-            <a:r>
-              <a:rPr lang="en-US" dirty="0"/>
-              <a:t> away from the iPhone, or that of experiment C. Even though experiment A picked up a stronger signal, it lacked the consistency over the long distance that experiment C displayed.</a:t>
-            </a:r>
-            <a:r>
-              <a:rPr lang="en-US" dirty="0" smtClean="0">
-                <a:effectLst/>
-              </a:rPr>
-              <a:t> </a:t>
+          </a:p>
+          <a:p>
+            <a:r>
+              <a:rPr lang="en-US" dirty="0" smtClean="0"/>
+              <a:t>Trial B = 90</a:t>
+            </a:r>
+            <a:r>
+              <a:rPr lang="en-US" baseline="30000" dirty="0" smtClean="0"/>
+              <a:t>o</a:t>
+            </a:r>
+          </a:p>
+          <a:p>
+            <a:r>
+              <a:rPr lang="en-US" dirty="0" smtClean="0"/>
+              <a:t>Trial C = 180</a:t>
+            </a:r>
+            <a:r>
+              <a:rPr lang="en-US" baseline="30000" dirty="0" smtClean="0"/>
+              <a:t>o</a:t>
+            </a:r>
+          </a:p>
+          <a:p>
+            <a:r>
+              <a:rPr lang="en-US" dirty="0" smtClean="0"/>
+              <a:t>Trial D = 270</a:t>
+            </a:r>
+            <a:r>
+              <a:rPr lang="en-US" baseline="30000" dirty="0" smtClean="0"/>
+              <a:t>o</a:t>
+            </a:r>
+            <a:endParaRPr lang="en-US" baseline="30000" dirty="0"/>
+          </a:p>
+        </p:txBody>
+      </p:sp>
+      <p:sp>
+        <p:nvSpPr>
+          <p:cNvPr id="57" name="TextBox 56"/>
+          <p:cNvSpPr txBox="1"/>
+          <p:nvPr/>
+        </p:nvSpPr>
+        <p:spPr>
+          <a:xfrm>
+            <a:off x="20771393" y="24774638"/>
+            <a:ext cx="4577075" cy="5509200"/>
+          </a:xfrm>
+          <a:prstGeom prst="rect">
+            <a:avLst/>
+          </a:prstGeom>
+          <a:noFill/>
+        </p:spPr>
+        <p:txBody>
+          <a:bodyPr wrap="square" rtlCol="0">
+            <a:spAutoFit/>
+          </a:bodyPr>
+          <a:lstStyle/>
+          <a:p>
+            <a:r>
+              <a:rPr lang="en-US" dirty="0" smtClean="0"/>
+              <a:t>Graph 2:</a:t>
+            </a:r>
+          </a:p>
+          <a:p>
+            <a:r>
+              <a:rPr lang="en-US" dirty="0" smtClean="0"/>
+              <a:t>Comparison of each rotation to the 0</a:t>
+            </a:r>
+            <a:r>
+              <a:rPr lang="en-US" baseline="30000" dirty="0" smtClean="0"/>
+              <a:t>o</a:t>
+            </a:r>
+            <a:r>
+              <a:rPr lang="en-US" dirty="0" smtClean="0"/>
+              <a:t> trial. Positive values refer to a greater number of times seen.</a:t>
+            </a:r>
+          </a:p>
+        </p:txBody>
+      </p:sp>
+      <p:sp>
+        <p:nvSpPr>
+          <p:cNvPr id="13" name="TextBox 12"/>
+          <p:cNvSpPr txBox="1"/>
+          <p:nvPr/>
+        </p:nvSpPr>
+        <p:spPr>
+          <a:xfrm>
+            <a:off x="26138360" y="12208696"/>
+            <a:ext cx="11840104" cy="1446550"/>
+          </a:xfrm>
+          <a:prstGeom prst="rect">
+            <a:avLst/>
+          </a:prstGeom>
+          <a:noFill/>
+        </p:spPr>
+        <p:txBody>
+          <a:bodyPr wrap="square" rtlCol="0">
+            <a:spAutoFit/>
+          </a:bodyPr>
+          <a:lstStyle/>
+          <a:p>
+            <a:r>
+              <a:rPr lang="en-US" dirty="0" smtClean="0"/>
+              <a:t>Graph 3: Outdoor distance tests with the Raspberry Pi at a height of 4 feet.</a:t>
+            </a:r>
+            <a:endParaRPr lang="en-US" dirty="0"/>
+          </a:p>
+        </p:txBody>
+      </p:sp>
+      <p:sp>
+        <p:nvSpPr>
+          <p:cNvPr id="59" name="TextBox 58"/>
+          <p:cNvSpPr txBox="1"/>
+          <p:nvPr/>
+        </p:nvSpPr>
+        <p:spPr>
+          <a:xfrm>
+            <a:off x="26126882" y="20227095"/>
+            <a:ext cx="11840104" cy="2123658"/>
+          </a:xfrm>
+          <a:prstGeom prst="rect">
+            <a:avLst/>
+          </a:prstGeom>
+          <a:noFill/>
+        </p:spPr>
+        <p:txBody>
+          <a:bodyPr wrap="square" rtlCol="0">
+            <a:spAutoFit/>
+          </a:bodyPr>
+          <a:lstStyle/>
+          <a:p>
+            <a:r>
+              <a:rPr lang="en-US" dirty="0" smtClean="0"/>
+              <a:t>Graph 4: Outdoor motion trials with the Raspberry Pi on the ground and the iPhone 5 at waist height, at three different speeds.</a:t>
+            </a:r>
+            <a:endParaRPr lang="en-US" dirty="0"/>
+          </a:p>
+        </p:txBody>
+      </p:sp>
+      <p:pic>
+        <p:nvPicPr>
+          <p:cNvPr id="14" name="Picture 13" descr="InsideThroughAWall.jpg"/>
+          <p:cNvPicPr>
+            <a:picLocks noChangeAspect="1"/>
+          </p:cNvPicPr>
+          <p:nvPr/>
+        </p:nvPicPr>
+        <p:blipFill>
+          <a:blip r:embed="rId7">
+            <a:extLst>
+              <a:ext uri="{28A0092B-C50C-407E-A947-70E740481C1C}">
+                <a14:useLocalDpi xmlns:a14="http://schemas.microsoft.com/office/drawing/2010/main" val="0"/>
+              </a:ext>
+            </a:extLst>
+          </a:blip>
+          <a:stretch>
+            <a:fillRect/>
+          </a:stretch>
+        </p:blipFill>
+        <p:spPr>
+          <a:xfrm>
+            <a:off x="26123917" y="22532819"/>
+            <a:ext cx="9802667" cy="5940470"/>
+          </a:xfrm>
+          <a:prstGeom prst="rect">
+            <a:avLst/>
+          </a:prstGeom>
+        </p:spPr>
+      </p:pic>
+      <p:sp>
+        <p:nvSpPr>
+          <p:cNvPr id="61" name="TextBox 60"/>
+          <p:cNvSpPr txBox="1"/>
+          <p:nvPr/>
+        </p:nvSpPr>
+        <p:spPr>
+          <a:xfrm>
+            <a:off x="26138360" y="28555230"/>
+            <a:ext cx="11840104" cy="2123658"/>
+          </a:xfrm>
+          <a:prstGeom prst="rect">
+            <a:avLst/>
+          </a:prstGeom>
+          <a:noFill/>
+        </p:spPr>
+        <p:txBody>
+          <a:bodyPr wrap="square" rtlCol="0">
+            <a:spAutoFit/>
+          </a:bodyPr>
+          <a:lstStyle/>
+          <a:p>
+            <a:r>
+              <a:rPr lang="en-US" dirty="0" smtClean="0"/>
+              <a:t>Graph 5: Indoor trials with a wall between the iPhone 5 and the Raspberry Pi, moving the iPhone 5, Raspberry Pi, and both, respectively.</a:t>
             </a:r>
             <a:endParaRPr lang="en-US" dirty="0"/>
           </a:p>

</xml_diff>

<commit_message>
Add comments.  See the "Review" tab to go through the "JS" notes.
</commit_message>
<xml_diff>
--- a/writeup/Board Snapshot.pptx
+++ b/writeup/Board Snapshot.pptx
@@ -141,6 +141,52 @@
     </a:lvl9pPr>
   </p:defaultTextStyle>
 </p:presentation>
+</file>
+
+<file path=ppt/commentAuthors.xml><?xml version="1.0" encoding="utf-8"?>
+<p:cmAuthorLst xmlns:a="http://schemas.openxmlformats.org/drawingml/2006/main" xmlns:r="http://schemas.openxmlformats.org/officeDocument/2006/relationships" xmlns:p="http://schemas.openxmlformats.org/presentationml/2006/main">
+  <p:cmAuthor id="0" name="Jeff Squyres" initials="JS" lastIdx="9" clrIdx="0"/>
+</p:cmAuthorLst>
+</file>
+
+<file path=ppt/comments/comment1.xml><?xml version="1.0" encoding="utf-8"?>
+<p:cmLst xmlns:a="http://schemas.openxmlformats.org/drawingml/2006/main" xmlns:r="http://schemas.openxmlformats.org/officeDocument/2006/relationships" xmlns:p="http://schemas.openxmlformats.org/presentationml/2006/main">
+  <p:cm authorId="0" dt="2014-01-26T18:44:15.681" idx="2">
+    <p:pos x="14977" y="5035"/>
+    <p:text>You probably want to call this "ideal conditions", i.e., with no interference.  Then the indoor tests are in practical conditions, with walls and other housing materials in the way, etc.</p:text>
+  </p:cm>
+  <p:cm authorId="0" dt="2014-01-26T18:45:08.142" idx="3">
+    <p:pos x="15377" y="3765"/>
+    <p:text>This is not important for tomorrow, but this is a lot of words words words.  Can you use more pictures and less words?</p:text>
+  </p:cm>
+  <p:cm authorId="0" dt="2014-01-26T18:46:19.140" idx="4">
+    <p:pos x="10494" y="13506"/>
+    <p:text>Picture = 1000 words here (e.g., for the 4 orientations)
+</p:text>
+  </p:cm>
+  <p:cm authorId="0" dt="2014-01-26T18:47:06.237" idx="5">
+    <p:pos x="15872" y="11329"/>
+    <p:text>Hmm.  These graphs came out really small, didn't they?  They're going to be hard to read in person.
+I wonder if we need to average the 2 experiments, and therefore show 4 lines in each graph, instead of 8...?</p:text>
+  </p:cm>
+  <p:cm authorId="0" dt="2014-01-26T18:48:46.954" idx="6">
+    <p:pos x="23674" y="13188"/>
+    <p:text>I do believe that this is the first place you mentioned the iPhone.</p:text>
+  </p:cm>
+  <p:cm authorId="0" dt="2014-01-26T18:49:40.195" idx="7">
+    <p:pos x="28326" y="4792"/>
+    <p:text>Make the "o" be raised -- not 0o, but 0 with a little "o" raised up like an exponent.</p:text>
+  </p:cm>
+  <p:cm authorId="0" dt="2014-01-26T18:50:19.677" idx="8">
+    <p:pos x="30454" y="14198"/>
+    <p:text>I'd have a short sentence or two, and then summarize the results in bullets.</p:text>
+  </p:cm>
+  <p:cm authorId="0" dt="2014-01-26T18:51:33.783" idx="9">
+    <p:pos x="6830" y="16881"/>
+    <p:text>The logo is for BT 4.0, but you've only mentioned BLE before this.  I.e., you haven't tried BT 4.0 to BLE at all in the text.
+Either find a logo for BLE (or "Bluetooth Smart"), or explain how BLE is related to BT 4.0.</p:text>
+  </p:cm>
+</p:cmLst>
 </file>
 
 <file path=ppt/handoutMasters/handoutMaster1.xml><?xml version="1.0" encoding="utf-8"?>
@@ -1545,7 +1591,7 @@
             <a:fld id="{BDA5651B-C405-A149-B22A-CA338DFD0D46}" type="datetime1">
               <a:rPr lang="en-US"/>
               <a:pPr/>
-              <a:t>1/24/14</a:t>
+              <a:t>1/26/14</a:t>
             </a:fld>
             <a:endParaRPr lang="en-US"/>
           </a:p>
@@ -2117,7 +2163,7 @@
             <a:fld id="{4C0CB2A7-298B-0346-9691-9743C8FCC14F}" type="datetime1">
               <a:rPr lang="en-US"/>
               <a:pPr/>
-              <a:t>1/24/14</a:t>
+              <a:t>1/26/14</a:t>
             </a:fld>
             <a:endParaRPr lang="en-US"/>
           </a:p>
@@ -2323,7 +2369,7 @@
             <a:fld id="{FC7DC0D9-3080-6348-9E83-AA7D17CED573}" type="datetime1">
               <a:rPr lang="en-US"/>
               <a:pPr/>
-              <a:t>1/24/14</a:t>
+              <a:t>1/26/14</a:t>
             </a:fld>
             <a:endParaRPr lang="en-US"/>
           </a:p>
@@ -2519,7 +2565,7 @@
             <a:fld id="{BF013981-7038-D14E-B481-885CFE012C4D}" type="datetime1">
               <a:rPr lang="en-US"/>
               <a:pPr/>
-              <a:t>1/24/14</a:t>
+              <a:t>1/26/14</a:t>
             </a:fld>
             <a:endParaRPr lang="en-US"/>
           </a:p>
@@ -2737,7 +2783,7 @@
             <a:fld id="{D470504F-A014-0649-82C6-EE739CECA6DB}" type="datetime1">
               <a:rPr lang="en-US"/>
               <a:pPr/>
-              <a:t>1/24/14</a:t>
+              <a:t>1/26/14</a:t>
             </a:fld>
             <a:endParaRPr lang="en-US"/>
           </a:p>
@@ -3051,7 +3097,7 @@
             <a:fld id="{10AFF9DE-996D-6E4C-AE92-904B846DA7DE}" type="datetime1">
               <a:rPr lang="en-US"/>
               <a:pPr/>
-              <a:t>1/24/14</a:t>
+              <a:t>1/26/14</a:t>
             </a:fld>
             <a:endParaRPr lang="en-US"/>
           </a:p>
@@ -3504,7 +3550,7 @@
             <a:fld id="{C5D4D892-8179-8947-A7BD-0F0304791D71}" type="datetime1">
               <a:rPr lang="en-US"/>
               <a:pPr/>
-              <a:t>1/24/14</a:t>
+              <a:t>1/26/14</a:t>
             </a:fld>
             <a:endParaRPr lang="en-US"/>
           </a:p>
@@ -3648,7 +3694,7 @@
             <a:fld id="{65FB1D16-1BB6-6D45-BD68-0698BE537699}" type="datetime1">
               <a:rPr lang="en-US"/>
               <a:pPr/>
-              <a:t>1/24/14</a:t>
+              <a:t>1/26/14</a:t>
             </a:fld>
             <a:endParaRPr lang="en-US"/>
           </a:p>
@@ -3769,7 +3815,7 @@
             <a:fld id="{6574763F-ABE3-6A47-9EC3-D2E3DB9DD054}" type="datetime1">
               <a:rPr lang="en-US"/>
               <a:pPr/>
-              <a:t>1/24/14</a:t>
+              <a:t>1/26/14</a:t>
             </a:fld>
             <a:endParaRPr lang="en-US"/>
           </a:p>
@@ -4072,7 +4118,7 @@
             <a:fld id="{9AC780A8-A81A-4D47-8961-A08D004F5898}" type="datetime1">
               <a:rPr lang="en-US"/>
               <a:pPr/>
-              <a:t>1/24/14</a:t>
+              <a:t>1/26/14</a:t>
             </a:fld>
             <a:endParaRPr lang="en-US"/>
           </a:p>
@@ -4352,7 +4398,7 @@
             <a:fld id="{1BB05508-BBA8-7A43-8481-D94387CAC796}" type="datetime1">
               <a:rPr lang="en-US"/>
               <a:pPr/>
-              <a:t>1/24/14</a:t>
+              <a:t>1/26/14</a:t>
             </a:fld>
             <a:endParaRPr lang="en-US"/>
           </a:p>
@@ -5227,7 +5273,7 @@
             <a:fld id="{9FC0DD12-D298-C645-BD79-BE38BB9577FA}" type="datetime1">
               <a:rPr lang="en-US"/>
               <a:pPr/>
-              <a:t>1/24/14</a:t>
+              <a:t>1/26/14</a:t>
             </a:fld>
             <a:endParaRPr lang="en-US"/>
           </a:p>
@@ -8341,15 +8387,27 @@
             <a:pPr eaLnBrk="1" hangingPunct="1"/>
             <a:r>
               <a:rPr lang="en-US" dirty="0" smtClean="0"/>
-              <a:t>The first step in determining the practical range was to establish a baseline and determine whether the direction of the Bluetooth nub mattered. These two were tested outdoors on flat ground. Then the Raspberry Pi was raised to a height of 4 feet, and the experiments were repeated using the ideal orientation of the nub. Placing the Raspberry Pi back on the ground, motion tests were performed by moving in a straight line with the </a:t>
+              <a:t>The first step in determining the practical range was to establish a baseline and determine whether the direction of the Bluetooth nub mattered. These two were tested outdoors on flat ground. Then the Raspberry Pi was raised to a height of 4 feet, and the experiments were repeated using the ideal </a:t>
             </a:r>
             <a:r>
               <a:rPr lang="en-US" dirty="0" err="1" smtClean="0"/>
-              <a:t>cosest</a:t>
+              <a:t>orintation</a:t>
             </a:r>
             <a:r>
               <a:rPr lang="en-US" dirty="0" smtClean="0"/>
-              <a:t> point being the measurement. Lastly, the first test was repeated inside, except with a wall placed between the two devices. It was tested moving each device away from the wall as well as moving both devices.</a:t>
+              <a:t> </a:t>
+            </a:r>
+            <a:r>
+              <a:rPr lang="en-US" dirty="0" smtClean="0"/>
+              <a:t>of the nub. Placing the Raspberry Pi back on the ground, motion tests were performed by moving in a straight line with the </a:t>
+            </a:r>
+            <a:r>
+              <a:rPr lang="en-US" dirty="0" smtClean="0"/>
+              <a:t>closest </a:t>
+            </a:r>
+            <a:r>
+              <a:rPr lang="en-US" dirty="0" smtClean="0"/>
+              <a:t>point being the measurement. Lastly, the first test was repeated inside, except with a wall placed between the two devices. It was tested moving each device away from the wall as well as moving both devices.</a:t>
             </a:r>
             <a:endParaRPr lang="en-US" dirty="0"/>
           </a:p>
@@ -8830,7 +8888,7 @@
         </p:blipFill>
         <p:spPr>
           <a:xfrm>
-            <a:off x="5688705" y="26867763"/>
+            <a:off x="4110883" y="26797898"/>
             <a:ext cx="6731000" cy="3784600"/>
           </a:xfrm>
           <a:prstGeom prst="rect">

</xml_diff>

<commit_message>
Latest version of the snapshot with modifications based on your comments
</commit_message>
<xml_diff>
--- a/writeup/Board Snapshot.pptx
+++ b/writeup/Board Snapshot.pptx
@@ -151,40 +151,10 @@
 
 <file path=ppt/comments/comment1.xml><?xml version="1.0" encoding="utf-8"?>
 <p:cmLst xmlns:a="http://schemas.openxmlformats.org/drawingml/2006/main" xmlns:r="http://schemas.openxmlformats.org/officeDocument/2006/relationships" xmlns:p="http://schemas.openxmlformats.org/presentationml/2006/main">
-  <p:cm authorId="0" dt="2014-01-26T18:44:15.681" idx="2">
-    <p:pos x="14977" y="5035"/>
-    <p:text>You probably want to call this "ideal conditions", i.e., with no interference.  Then the indoor tests are in practical conditions, with walls and other housing materials in the way, etc.</p:text>
-  </p:cm>
-  <p:cm authorId="0" dt="2014-01-26T18:45:08.142" idx="3">
-    <p:pos x="15377" y="3765"/>
-    <p:text>This is not important for tomorrow, but this is a lot of words words words.  Can you use more pictures and less words?</p:text>
-  </p:cm>
   <p:cm authorId="0" dt="2014-01-26T18:46:19.140" idx="4">
     <p:pos x="10494" y="13506"/>
     <p:text>Picture = 1000 words here (e.g., for the 4 orientations)
 </p:text>
-  </p:cm>
-  <p:cm authorId="0" dt="2014-01-26T18:47:06.237" idx="5">
-    <p:pos x="15872" y="11329"/>
-    <p:text>Hmm.  These graphs came out really small, didn't they?  They're going to be hard to read in person.
-I wonder if we need to average the 2 experiments, and therefore show 4 lines in each graph, instead of 8...?</p:text>
-  </p:cm>
-  <p:cm authorId="0" dt="2014-01-26T18:48:46.954" idx="6">
-    <p:pos x="23674" y="13188"/>
-    <p:text>I do believe that this is the first place you mentioned the iPhone.</p:text>
-  </p:cm>
-  <p:cm authorId="0" dt="2014-01-26T18:49:40.195" idx="7">
-    <p:pos x="28326" y="4792"/>
-    <p:text>Make the "o" be raised -- not 0o, but 0 with a little "o" raised up like an exponent.</p:text>
-  </p:cm>
-  <p:cm authorId="0" dt="2014-01-26T18:50:19.677" idx="8">
-    <p:pos x="30454" y="14198"/>
-    <p:text>I'd have a short sentence or two, and then summarize the results in bullets.</p:text>
-  </p:cm>
-  <p:cm authorId="0" dt="2014-01-26T18:51:33.783" idx="9">
-    <p:pos x="6830" y="16881"/>
-    <p:text>The logo is for BT 4.0, but you've only mentioned BLE before this.  I.e., you haven't tried BT 4.0 to BLE at all in the text.
-Either find a logo for BLE (or "Bluetooth Smart"), or explain how BLE is related to BT 4.0.</p:text>
   </p:cm>
 </p:cmLst>
 </file>
@@ -6352,7 +6322,7 @@
         </p:nvSpPr>
         <p:spPr bwMode="auto">
           <a:xfrm>
-            <a:off x="2447925" y="14924698"/>
+            <a:off x="2447925" y="18009042"/>
             <a:ext cx="10164763" cy="795337"/>
           </a:xfrm>
           <a:prstGeom prst="rect">
@@ -6521,8 +6491,8 @@
         </p:nvSpPr>
         <p:spPr bwMode="auto">
           <a:xfrm>
-            <a:off x="3092026" y="15661604"/>
-            <a:ext cx="8625169" cy="6863416"/>
+            <a:off x="3092026" y="18882022"/>
+            <a:ext cx="8625169" cy="4524316"/>
           </a:xfrm>
           <a:prstGeom prst="rect">
             <a:avLst/>
@@ -6674,10 +6644,10 @@
           <a:p>
             <a:pPr eaLnBrk="1" hangingPunct="1"/>
             <a:r>
-              <a:rPr lang="en-US" dirty="0" smtClean="0"/>
+              <a:rPr lang="en-US" sz="3600" dirty="0" smtClean="0"/>
               <a:t>With the beginnings of smart appliances around the home, technology such as Bluetooth Low Energy is becoming more important than ever, but little is known about its range. This experiment was designed to determine the practical range of Bluetooth Low Energy both inside and outside.</a:t>
             </a:r>
-            <a:endParaRPr lang="en-US" dirty="0"/>
+            <a:endParaRPr lang="en-US" sz="3600" dirty="0"/>
           </a:p>
         </p:txBody>
       </p:sp>
@@ -6691,7 +6661,7 @@
         </p:nvSpPr>
         <p:spPr bwMode="auto">
           <a:xfrm>
-            <a:off x="2474913" y="22981090"/>
+            <a:off x="2474913" y="23842892"/>
             <a:ext cx="10085387" cy="769937"/>
           </a:xfrm>
           <a:prstGeom prst="rect">
@@ -7206,7 +7176,7 @@
         </p:nvSpPr>
         <p:spPr bwMode="auto">
           <a:xfrm>
-            <a:off x="38742020" y="21715949"/>
+            <a:off x="38742020" y="18495531"/>
             <a:ext cx="9923462" cy="769937"/>
           </a:xfrm>
           <a:prstGeom prst="rect">
@@ -7548,7 +7518,7 @@
         </p:nvSpPr>
         <p:spPr bwMode="auto">
           <a:xfrm>
-            <a:off x="13137844" y="16916747"/>
+            <a:off x="13137844" y="14830279"/>
             <a:ext cx="12103100" cy="768350"/>
           </a:xfrm>
           <a:prstGeom prst="rect">
@@ -7717,7 +7687,7 @@
         </p:nvSpPr>
         <p:spPr bwMode="auto">
           <a:xfrm>
-            <a:off x="38566725" y="5497513"/>
+            <a:off x="38566725" y="5633587"/>
             <a:ext cx="9950450" cy="769937"/>
           </a:xfrm>
           <a:prstGeom prst="rect">
@@ -7890,8 +7860,8 @@
         </p:nvSpPr>
         <p:spPr bwMode="auto">
           <a:xfrm>
-            <a:off x="3072691" y="23802929"/>
-            <a:ext cx="9218074" cy="2800767"/>
+            <a:off x="3072691" y="24664731"/>
+            <a:ext cx="9218074" cy="2308324"/>
           </a:xfrm>
           <a:prstGeom prst="rect">
             <a:avLst/>
@@ -8043,10 +8013,10 @@
           <a:p>
             <a:pPr eaLnBrk="1" hangingPunct="1"/>
             <a:r>
-              <a:rPr lang="en-US" dirty="0" smtClean="0"/>
+              <a:rPr lang="en-US" sz="3600" dirty="0" smtClean="0"/>
               <a:t>A Raspberry Pi using a Low Energy Bluetooth USB nub will be able to detect nearby devices from a distance no greater than 40 feet.</a:t>
             </a:r>
-            <a:endParaRPr lang="en-US" dirty="0"/>
+            <a:endParaRPr lang="en-US" sz="3600" dirty="0"/>
           </a:p>
         </p:txBody>
       </p:sp>
@@ -8234,7 +8204,7 @@
         <p:spPr bwMode="auto">
           <a:xfrm>
             <a:off x="13486731" y="5940551"/>
-            <a:ext cx="11258676" cy="10926066"/>
+            <a:ext cx="11258676" cy="8402302"/>
           </a:xfrm>
           <a:prstGeom prst="rect">
             <a:avLst/>
@@ -8386,30 +8356,50 @@
           <a:p>
             <a:pPr eaLnBrk="1" hangingPunct="1"/>
             <a:r>
-              <a:rPr lang="en-US" dirty="0" smtClean="0"/>
-              <a:t>The first step in determining the practical range was to establish a baseline and determine whether the direction of the Bluetooth nub mattered. These two were tested outdoors on flat ground. Then the Raspberry Pi was raised to a height of 4 feet, and the experiments were repeated using the ideal </a:t>
-            </a:r>
-            <a:r>
-              <a:rPr lang="en-US" dirty="0" err="1" smtClean="0"/>
+              <a:rPr lang="en-US" sz="3600" dirty="0" smtClean="0"/>
+              <a:t>In </a:t>
+            </a:r>
+            <a:r>
+              <a:rPr lang="en-US" sz="3600" dirty="0"/>
+              <a:t>all of the tests, we measured the number of times the Raspberry Pi saw a Bluetooth Low Energy beacon from an iPhone 5. The </a:t>
+            </a:r>
+            <a:r>
+              <a:rPr lang="en-US" sz="3600" dirty="0" smtClean="0"/>
+              <a:t>first step in determining the practical range was to establish a baseline and determine whether the direction of the Bluetooth nub mattered</a:t>
+            </a:r>
+            <a:r>
+              <a:rPr lang="en-US" sz="3600" dirty="0" smtClean="0"/>
+              <a:t>. These </a:t>
+            </a:r>
+            <a:r>
+              <a:rPr lang="en-US" sz="3600" dirty="0" smtClean="0"/>
+              <a:t>two were tested </a:t>
+            </a:r>
+            <a:r>
+              <a:rPr lang="en-US" sz="3600" dirty="0" smtClean="0"/>
+              <a:t>in ideal conditions. </a:t>
+            </a:r>
+            <a:r>
+              <a:rPr lang="en-US" sz="3600" dirty="0" smtClean="0"/>
+              <a:t>Then the Raspberry Pi was raised to a height of 4 feet, and the experiments were repeated using the ideal </a:t>
+            </a:r>
+            <a:r>
+              <a:rPr lang="en-US" sz="3600" dirty="0" err="1" smtClean="0"/>
               <a:t>orintation</a:t>
             </a:r>
             <a:r>
-              <a:rPr lang="en-US" dirty="0" smtClean="0"/>
-              <a:t> </a:t>
-            </a:r>
-            <a:r>
-              <a:rPr lang="en-US" dirty="0" smtClean="0"/>
-              <a:t>of the nub. Placing the Raspberry Pi back on the ground, motion tests were performed by moving in a straight line with the </a:t>
-            </a:r>
-            <a:r>
-              <a:rPr lang="en-US" dirty="0" smtClean="0"/>
-              <a:t>closest </a:t>
-            </a:r>
-            <a:r>
-              <a:rPr lang="en-US" dirty="0" smtClean="0"/>
-              <a:t>point being the measurement. Lastly, the first test was repeated inside, except with a wall placed between the two devices. It was tested moving each device away from the wall as well as moving both devices.</a:t>
-            </a:r>
-            <a:endParaRPr lang="en-US" dirty="0"/>
+              <a:rPr lang="en-US" sz="3600" dirty="0" smtClean="0"/>
+              <a:t> of the nub. Placing the Raspberry Pi back on the ground, motion tests were performed by moving in a straight line with the closest point being the measurement. Lastly, the first test was repeated </a:t>
+            </a:r>
+            <a:r>
+              <a:rPr lang="en-US" sz="3600" dirty="0" smtClean="0"/>
+              <a:t>in practical conditions, with a wall between the devices. </a:t>
+            </a:r>
+            <a:r>
+              <a:rPr lang="en-US" sz="3600" dirty="0" smtClean="0"/>
+              <a:t>It was tested moving each device away from the wall as well as moving both devices.</a:t>
+            </a:r>
+            <a:endParaRPr lang="en-US" sz="3600" dirty="0"/>
           </a:p>
         </p:txBody>
       </p:sp>
@@ -8423,8 +8413,8 @@
         </p:nvSpPr>
         <p:spPr bwMode="auto">
           <a:xfrm>
-            <a:off x="39133462" y="6227332"/>
-            <a:ext cx="9415059" cy="14311609"/>
+            <a:off x="39133462" y="6771628"/>
+            <a:ext cx="9415059" cy="10064296"/>
           </a:xfrm>
           <a:prstGeom prst="rect">
             <a:avLst/>
@@ -8576,205 +8566,40 @@
           <a:p>
             <a:pPr eaLnBrk="1" hangingPunct="1"/>
             <a:r>
-              <a:rPr lang="en-US" dirty="0" smtClean="0"/>
-              <a:t>When first determining the ideal orientation of the Bluetooth nub, it appeared as though 0o was ideal. Although 0o was the strongest, 180o turned out to be most consistent over the longest distance, making it the ideal orientation.</a:t>
+              <a:rPr lang="en-US" sz="3600" dirty="0" smtClean="0"/>
+              <a:t>When first determining the ideal orientation of the Bluetooth nub, it appeared as though 0</a:t>
+            </a:r>
+            <a:r>
+              <a:rPr lang="en-US" sz="3600" baseline="30000" dirty="0" smtClean="0"/>
+              <a:t>o</a:t>
+            </a:r>
+            <a:r>
+              <a:rPr lang="en-US" sz="3600" dirty="0" smtClean="0"/>
+              <a:t> was ideal. Although 0o was the strongest, 180o turned out to be most consistent over the longest distance, making it the ideal orientation.</a:t>
             </a:r>
           </a:p>
           <a:p>
             <a:pPr eaLnBrk="1" hangingPunct="1"/>
-            <a:endParaRPr lang="en-US" dirty="0"/>
+            <a:endParaRPr lang="en-US" sz="3600" dirty="0"/>
           </a:p>
           <a:p>
             <a:pPr eaLnBrk="1" hangingPunct="1"/>
             <a:r>
-              <a:rPr lang="en-US" dirty="0" smtClean="0"/>
+              <a:rPr lang="en-US" sz="3600" dirty="0" smtClean="0"/>
               <a:t>When comparing the height of 0 feet and 4 feet, it became very apparent that a height of 4 feet greatly increased the range. A distance of 80 feet was the farthest that the available setup could test.</a:t>
             </a:r>
           </a:p>
           <a:p>
             <a:pPr eaLnBrk="1" hangingPunct="1"/>
-            <a:endParaRPr lang="en-US" dirty="0"/>
+            <a:endParaRPr lang="en-US" sz="3600" dirty="0"/>
           </a:p>
           <a:p>
             <a:pPr eaLnBrk="1" hangingPunct="1"/>
             <a:r>
-              <a:rPr lang="en-US" dirty="0" smtClean="0"/>
+              <a:rPr lang="en-US" sz="3600" dirty="0" smtClean="0"/>
               <a:t>With a wall placed between the two devices, very little difference was seen through 15 feet, but at distances greater than 15 feet, the signal was strongest by far when neither device was next to the wall.</a:t>
             </a:r>
-            <a:endParaRPr lang="en-US" dirty="0"/>
-          </a:p>
-        </p:txBody>
-      </p:sp>
-      <p:sp>
-        <p:nvSpPr>
-          <p:cNvPr id="45" name="Text Box 148"/>
-          <p:cNvSpPr txBox="1">
-            <a:spLocks noChangeArrowheads="1"/>
-          </p:cNvSpPr>
-          <p:nvPr/>
-        </p:nvSpPr>
-        <p:spPr bwMode="auto">
-          <a:xfrm>
-            <a:off x="39461215" y="21918370"/>
-            <a:ext cx="8108950" cy="954107"/>
-          </a:xfrm>
-          <a:prstGeom prst="rect">
-            <a:avLst/>
-          </a:prstGeom>
-          <a:noFill/>
-          <a:ln>
-            <a:noFill/>
-          </a:ln>
-          <a:extLst>
-            <a:ext uri="{909E8E84-426E-40dd-AFC4-6F175D3DCCD1}">
-              <a14:hiddenFill xmlns:a14="http://schemas.microsoft.com/office/drawing/2010/main">
-                <a:solidFill>
-                  <a:srgbClr val="FFFFFF"/>
-                </a:solidFill>
-              </a14:hiddenFill>
-            </a:ext>
-            <a:ext uri="{91240B29-F687-4f45-9708-019B960494DF}">
-              <a14:hiddenLine xmlns:a14="http://schemas.microsoft.com/office/drawing/2010/main" w="9525">
-                <a:solidFill>
-                  <a:srgbClr val="000000"/>
-                </a:solidFill>
-                <a:miter lim="800000"/>
-                <a:headEnd/>
-                <a:tailEnd/>
-              </a14:hiddenLine>
-            </a:ext>
-          </a:extLst>
-        </p:spPr>
-        <p:txBody>
-          <a:bodyPr>
-            <a:spAutoFit/>
-          </a:bodyPr>
-          <a:lstStyle>
-            <a:lvl1pPr eaLnBrk="0" hangingPunct="0">
-              <a:defRPr sz="4400">
-                <a:solidFill>
-                  <a:schemeClr val="tx1"/>
-                </a:solidFill>
-                <a:latin typeface="Arial" charset="0"/>
-                <a:ea typeface="ＭＳ Ｐゴシック" charset="0"/>
-                <a:cs typeface="Arial" charset="0"/>
-              </a:defRPr>
-            </a:lvl1pPr>
-            <a:lvl2pPr marL="742950" indent="-285750" eaLnBrk="0" hangingPunct="0">
-              <a:defRPr sz="4400">
-                <a:solidFill>
-                  <a:schemeClr val="tx1"/>
-                </a:solidFill>
-                <a:latin typeface="Arial" charset="0"/>
-                <a:ea typeface="Arial" charset="0"/>
-                <a:cs typeface="Arial" charset="0"/>
-              </a:defRPr>
-            </a:lvl2pPr>
-            <a:lvl3pPr marL="1143000" indent="-228600" eaLnBrk="0" hangingPunct="0">
-              <a:defRPr sz="4400">
-                <a:solidFill>
-                  <a:schemeClr val="tx1"/>
-                </a:solidFill>
-                <a:latin typeface="Arial" charset="0"/>
-                <a:ea typeface="Arial" charset="0"/>
-                <a:cs typeface="Arial" charset="0"/>
-              </a:defRPr>
-            </a:lvl3pPr>
-            <a:lvl4pPr marL="1600200" indent="-228600" eaLnBrk="0" hangingPunct="0">
-              <a:defRPr sz="4400">
-                <a:solidFill>
-                  <a:schemeClr val="tx1"/>
-                </a:solidFill>
-                <a:latin typeface="Arial" charset="0"/>
-                <a:ea typeface="Arial" charset="0"/>
-                <a:cs typeface="Arial" charset="0"/>
-              </a:defRPr>
-            </a:lvl4pPr>
-            <a:lvl5pPr marL="2057400" indent="-228600" eaLnBrk="0" hangingPunct="0">
-              <a:defRPr sz="4400">
-                <a:solidFill>
-                  <a:schemeClr val="tx1"/>
-                </a:solidFill>
-                <a:latin typeface="Arial" charset="0"/>
-                <a:ea typeface="Arial" charset="0"/>
-                <a:cs typeface="Arial" charset="0"/>
-              </a:defRPr>
-            </a:lvl5pPr>
-            <a:lvl6pPr marL="2514600" indent="-228600" eaLnBrk="0" fontAlgn="base" hangingPunct="0">
-              <a:spcBef>
-                <a:spcPct val="0"/>
-              </a:spcBef>
-              <a:spcAft>
-                <a:spcPct val="0"/>
-              </a:spcAft>
-              <a:defRPr sz="4400">
-                <a:solidFill>
-                  <a:schemeClr val="tx1"/>
-                </a:solidFill>
-                <a:latin typeface="Arial" charset="0"/>
-                <a:ea typeface="Arial" charset="0"/>
-                <a:cs typeface="Arial" charset="0"/>
-              </a:defRPr>
-            </a:lvl6pPr>
-            <a:lvl7pPr marL="2971800" indent="-228600" eaLnBrk="0" fontAlgn="base" hangingPunct="0">
-              <a:spcBef>
-                <a:spcPct val="0"/>
-              </a:spcBef>
-              <a:spcAft>
-                <a:spcPct val="0"/>
-              </a:spcAft>
-              <a:defRPr sz="4400">
-                <a:solidFill>
-                  <a:schemeClr val="tx1"/>
-                </a:solidFill>
-                <a:latin typeface="Arial" charset="0"/>
-                <a:ea typeface="Arial" charset="0"/>
-                <a:cs typeface="Arial" charset="0"/>
-              </a:defRPr>
-            </a:lvl7pPr>
-            <a:lvl8pPr marL="3429000" indent="-228600" eaLnBrk="0" fontAlgn="base" hangingPunct="0">
-              <a:spcBef>
-                <a:spcPct val="0"/>
-              </a:spcBef>
-              <a:spcAft>
-                <a:spcPct val="0"/>
-              </a:spcAft>
-              <a:defRPr sz="4400">
-                <a:solidFill>
-                  <a:schemeClr val="tx1"/>
-                </a:solidFill>
-                <a:latin typeface="Arial" charset="0"/>
-                <a:ea typeface="Arial" charset="0"/>
-                <a:cs typeface="Arial" charset="0"/>
-              </a:defRPr>
-            </a:lvl8pPr>
-            <a:lvl9pPr marL="3886200" indent="-228600" eaLnBrk="0" fontAlgn="base" hangingPunct="0">
-              <a:spcBef>
-                <a:spcPct val="0"/>
-              </a:spcBef>
-              <a:spcAft>
-                <a:spcPct val="0"/>
-              </a:spcAft>
-              <a:defRPr sz="4400">
-                <a:solidFill>
-                  <a:schemeClr val="tx1"/>
-                </a:solidFill>
-                <a:latin typeface="Arial" charset="0"/>
-                <a:ea typeface="Arial" charset="0"/>
-                <a:cs typeface="Arial" charset="0"/>
-              </a:defRPr>
-            </a:lvl9pPr>
-          </a:lstStyle>
-          <a:p>
-            <a:pPr eaLnBrk="1" hangingPunct="1"/>
-            <a:r>
-              <a:rPr lang="en-US" sz="2800" dirty="0"/>
-              <a:t/>
-            </a:r>
-            <a:br>
-              <a:rPr lang="en-US" sz="2800" dirty="0"/>
-            </a:br>
-            <a:endParaRPr lang="en-US" sz="2800" dirty="0"/>
+            <a:endParaRPr lang="en-US" sz="3600" dirty="0"/>
           </a:p>
         </p:txBody>
       </p:sp>
@@ -8787,7 +8612,7 @@
         <p:spPr>
           <a:xfrm>
             <a:off x="3091895" y="6373440"/>
-            <a:ext cx="9198870" cy="7540525"/>
+            <a:ext cx="9198870" cy="5078314"/>
           </a:xfrm>
           <a:prstGeom prst="rect">
             <a:avLst/>
@@ -8800,32 +8625,32 @@
           <a:lstStyle/>
           <a:p>
             <a:r>
-              <a:rPr lang="en-US" dirty="0"/>
+              <a:rPr lang="en-US" sz="3600" dirty="0"/>
               <a:t>Today’s world is booming with new technology from </a:t>
             </a:r>
             <a:r>
-              <a:rPr lang="en-US" dirty="0" err="1"/>
+              <a:rPr lang="en-US" sz="3600" dirty="0" err="1"/>
               <a:t>wearables</a:t>
             </a:r>
             <a:r>
-              <a:rPr lang="en-US" dirty="0"/>
+              <a:rPr lang="en-US" sz="3600" dirty="0"/>
               <a:t> to drones to technology-infused cars.  This multitude of technological advances is becoming so ingrained into our daily lives that our world requires a way to </a:t>
             </a:r>
             <a:r>
-              <a:rPr lang="en-US" dirty="0" smtClean="0"/>
+              <a:rPr lang="en-US" sz="3600" dirty="0" smtClean="0"/>
               <a:t>wirelessly </a:t>
             </a:r>
             <a:r>
-              <a:rPr lang="en-US" dirty="0"/>
+              <a:rPr lang="en-US" sz="3600" dirty="0"/>
               <a:t>interconnect them. Bluetooth Low Energy may just be that system, but its practical range remains uncertain in many situations.</a:t>
             </a:r>
             <a:r>
-              <a:rPr lang="en-US" dirty="0" smtClean="0">
+              <a:rPr lang="en-US" sz="3600" dirty="0" smtClean="0">
                 <a:effectLst/>
               </a:rPr>
               <a:t> </a:t>
             </a:r>
-            <a:endParaRPr lang="en-US" dirty="0"/>
+            <a:endParaRPr lang="en-US" sz="3600" dirty="0"/>
           </a:p>
         </p:txBody>
       </p:sp>
@@ -8837,8 +8662,8 @@
         </p:nvSpPr>
         <p:spPr>
           <a:xfrm>
-            <a:off x="39125603" y="22504326"/>
-            <a:ext cx="9422920" cy="8217633"/>
+            <a:off x="39125603" y="19646772"/>
+            <a:ext cx="9422920" cy="6740308"/>
           </a:xfrm>
           <a:prstGeom prst="rect">
             <a:avLst/>
@@ -8851,24 +8676,103 @@
           <a:lstStyle/>
           <a:p>
             <a:r>
-              <a:rPr lang="en-US" dirty="0" smtClean="0"/>
+              <a:rPr lang="en-US" sz="3600" dirty="0" smtClean="0"/>
               <a:t>The goal </a:t>
             </a:r>
             <a:r>
-              <a:rPr lang="en-US" dirty="0"/>
+              <a:rPr lang="en-US" sz="3600" dirty="0"/>
               <a:t>in this experiment was to determine the ideal setup for consistently detecting an iPhone using Bluetooth Low Energy and determine its range. </a:t>
             </a:r>
-            <a:r>
-              <a:rPr lang="en-US" dirty="0" smtClean="0"/>
-              <a:t>When the results from all of the tests are combined, it was determined that the ideal indoor setup consisted of placing the Raspberry Pi at a height of 4 feet away from a wall with the Bluetooth nub facing away from the general location of the iPhone.</a:t>
-            </a:r>
-            <a:endParaRPr lang="en-US" dirty="0"/>
+            <a:endParaRPr lang="en-US" sz="3600" dirty="0" smtClean="0"/>
+          </a:p>
+          <a:p>
+            <a:endParaRPr lang="en-US" sz="3600" dirty="0" smtClean="0"/>
+          </a:p>
+          <a:p>
+            <a:r>
+              <a:rPr lang="en-US" sz="3600" dirty="0"/>
+              <a:t>T</a:t>
+            </a:r>
+            <a:r>
+              <a:rPr lang="en-US" sz="3600" dirty="0" smtClean="0"/>
+              <a:t>he </a:t>
+            </a:r>
+            <a:r>
+              <a:rPr lang="en-US" sz="3600" dirty="0" smtClean="0"/>
+              <a:t>ideal indoor setup consisted </a:t>
+            </a:r>
+            <a:r>
+              <a:rPr lang="en-US" sz="3600" dirty="0" smtClean="0"/>
+              <a:t>of:</a:t>
+            </a:r>
+          </a:p>
+          <a:p>
+            <a:pPr marL="571500" indent="-571500">
+              <a:buFont typeface="Arial"/>
+              <a:buChar char="•"/>
+            </a:pPr>
+            <a:r>
+              <a:rPr lang="en-US" sz="3600" dirty="0" smtClean="0"/>
+              <a:t>placing </a:t>
+            </a:r>
+            <a:r>
+              <a:rPr lang="en-US" sz="3600" dirty="0" smtClean="0"/>
+              <a:t>the Raspberry Pi at a height of 4 </a:t>
+            </a:r>
+            <a:r>
+              <a:rPr lang="en-US" sz="3600" dirty="0" smtClean="0"/>
+              <a:t>feet</a:t>
+            </a:r>
+          </a:p>
+          <a:p>
+            <a:pPr marL="571500" indent="-571500">
+              <a:buFont typeface="Arial"/>
+              <a:buChar char="•"/>
+            </a:pPr>
+            <a:r>
+              <a:rPr lang="en-US" sz="3600" dirty="0" smtClean="0"/>
+              <a:t>away </a:t>
+            </a:r>
+            <a:r>
+              <a:rPr lang="en-US" sz="3600" dirty="0" smtClean="0"/>
+              <a:t>from a wall </a:t>
+            </a:r>
+            <a:endParaRPr lang="en-US" sz="3600" dirty="0" smtClean="0"/>
+          </a:p>
+          <a:p>
+            <a:pPr marL="571500" indent="-571500">
+              <a:buFont typeface="Arial"/>
+              <a:buChar char="•"/>
+            </a:pPr>
+            <a:r>
+              <a:rPr lang="en-US" sz="3600" dirty="0" smtClean="0"/>
+              <a:t>with </a:t>
+            </a:r>
+            <a:r>
+              <a:rPr lang="en-US" sz="3600" dirty="0" smtClean="0"/>
+              <a:t>the Bluetooth nub facing away from the general location of the </a:t>
+            </a:r>
+            <a:r>
+              <a:rPr lang="en-US" sz="3600" dirty="0" smtClean="0"/>
+              <a:t>iPhone</a:t>
+            </a:r>
+          </a:p>
+          <a:p>
+            <a:pPr marL="571500" indent="-571500">
+              <a:buFont typeface="Arial"/>
+              <a:buChar char="•"/>
+            </a:pPr>
+            <a:r>
+              <a:rPr lang="en-US" sz="3600" dirty="0" smtClean="0"/>
+              <a:t>Its range exceeds 80 feet</a:t>
+            </a:r>
+            <a:endParaRPr lang="en-US" sz="3600" dirty="0"/>
           </a:p>
         </p:txBody>
       </p:sp>
       <p:pic>
         <p:nvPicPr>
-          <p:cNvPr id="6" name="Picture 5" descr="bluetooth-4-logo.jpg"/>
+          <p:cNvPr id="7" name="Picture 6" descr="DistanceAt0ftWithRotation.jpg"/>
           <p:cNvPicPr>
             <a:picLocks noChangeAspect="1"/>
           </p:cNvPicPr>
@@ -8888,8 +8792,8 @@
         </p:blipFill>
         <p:spPr>
           <a:xfrm>
-            <a:off x="4110883" y="26797898"/>
-            <a:ext cx="6731000" cy="3784600"/>
+            <a:off x="16241528" y="15920571"/>
+            <a:ext cx="9045249" cy="7412617"/>
           </a:xfrm>
           <a:prstGeom prst="rect">
             <a:avLst/>
@@ -8898,7 +8802,7 @@
       </p:pic>
       <p:pic>
         <p:nvPicPr>
-          <p:cNvPr id="7" name="Picture 6" descr="DistanceAt0ftWithRotation.jpg"/>
+          <p:cNvPr id="8" name="Picture 7" descr="RelativeRotationGraph.jpg"/>
           <p:cNvPicPr>
             <a:picLocks noChangeAspect="1"/>
           </p:cNvPicPr>
@@ -8918,38 +8822,8 @@
         </p:blipFill>
         <p:spPr>
           <a:xfrm>
-            <a:off x="17397290" y="17985295"/>
-            <a:ext cx="7798775" cy="6391127"/>
-          </a:xfrm>
-          <a:prstGeom prst="rect">
-            <a:avLst/>
-          </a:prstGeom>
-        </p:spPr>
-      </p:pic>
-      <p:pic>
-        <p:nvPicPr>
-          <p:cNvPr id="8" name="Picture 7" descr="RelativeRotationGraph.jpg"/>
-          <p:cNvPicPr>
-            <a:picLocks noChangeAspect="1"/>
-          </p:cNvPicPr>
-          <p:nvPr/>
-        </p:nvPicPr>
-        <p:blipFill>
-          <a:blip r:embed="rId4">
-            <a:extLst>
-              <a:ext uri="{28A0092B-C50C-407E-A947-70E740481C1C}">
-                <a14:useLocalDpi xmlns:a14="http://schemas.microsoft.com/office/drawing/2010/main" val="0"/>
-              </a:ext>
-            </a:extLst>
-          </a:blip>
-          <a:stretch>
-            <a:fillRect/>
-          </a:stretch>
-        </p:blipFill>
-        <p:spPr>
-          <a:xfrm>
-            <a:off x="13233058" y="24676624"/>
-            <a:ext cx="7292520" cy="5927043"/>
+            <a:off x="13233058" y="23722114"/>
+            <a:ext cx="8466932" cy="6881554"/>
           </a:xfrm>
           <a:prstGeom prst="rect">
             <a:avLst/>
@@ -8965,7 +8839,7 @@
           <p:nvPr/>
         </p:nvPicPr>
         <p:blipFill>
-          <a:blip r:embed="rId5">
+          <a:blip r:embed="rId4">
             <a:extLst>
               <a:ext uri="{28A0092B-C50C-407E-A947-70E740481C1C}">
                 <a14:useLocalDpi xmlns:a14="http://schemas.microsoft.com/office/drawing/2010/main" val="0"/>
@@ -8995,7 +8869,7 @@
           <p:nvPr/>
         </p:nvPicPr>
         <p:blipFill>
-          <a:blip r:embed="rId6">
+          <a:blip r:embed="rId5">
             <a:extLst>
               <a:ext uri="{28A0092B-C50C-407E-A947-70E740481C1C}">
                 <a14:useLocalDpi xmlns:a14="http://schemas.microsoft.com/office/drawing/2010/main" val="0"/>
@@ -9024,8 +8898,8 @@
         </p:nvSpPr>
         <p:spPr>
           <a:xfrm>
-            <a:off x="13192086" y="18067242"/>
-            <a:ext cx="4096924" cy="6186308"/>
+            <a:off x="13192086" y="16162206"/>
+            <a:ext cx="3135907" cy="5078314"/>
           </a:xfrm>
           <a:prstGeom prst="rect">
             <a:avLst/>
@@ -9039,56 +8913,56 @@
           <a:lstStyle/>
           <a:p>
             <a:r>
-              <a:rPr lang="en-US" dirty="0" smtClean="0"/>
+              <a:rPr lang="en-US" sz="3600" dirty="0" smtClean="0"/>
               <a:t>Graph 1:</a:t>
             </a:r>
           </a:p>
           <a:p>
             <a:r>
-              <a:rPr lang="en-US" dirty="0" smtClean="0"/>
+              <a:rPr lang="en-US" sz="3600" dirty="0" smtClean="0"/>
               <a:t>Distance tests at a height of 0 feet, with rotation trials.</a:t>
             </a:r>
           </a:p>
           <a:p>
             <a:r>
-              <a:rPr lang="en-US" dirty="0" smtClean="0"/>
+              <a:rPr lang="en-US" sz="3600" dirty="0" smtClean="0"/>
               <a:t>Trial A = 0</a:t>
             </a:r>
             <a:r>
-              <a:rPr lang="en-US" baseline="30000" dirty="0" smtClean="0"/>
+              <a:rPr lang="en-US" sz="3600" baseline="30000" dirty="0" smtClean="0"/>
               <a:t>o</a:t>
             </a:r>
           </a:p>
           <a:p>
             <a:r>
-              <a:rPr lang="en-US" dirty="0" smtClean="0"/>
+              <a:rPr lang="en-US" sz="3600" dirty="0" smtClean="0"/>
               <a:t>Trial B = 90</a:t>
             </a:r>
             <a:r>
-              <a:rPr lang="en-US" baseline="30000" dirty="0" smtClean="0"/>
+              <a:rPr lang="en-US" sz="3600" baseline="30000" dirty="0" smtClean="0"/>
               <a:t>o</a:t>
             </a:r>
           </a:p>
           <a:p>
             <a:r>
-              <a:rPr lang="en-US" dirty="0" smtClean="0"/>
+              <a:rPr lang="en-US" sz="3600" dirty="0" smtClean="0"/>
               <a:t>Trial C = 180</a:t>
             </a:r>
             <a:r>
-              <a:rPr lang="en-US" baseline="30000" dirty="0" smtClean="0"/>
+              <a:rPr lang="en-US" sz="3600" baseline="30000" dirty="0" smtClean="0"/>
               <a:t>o</a:t>
             </a:r>
           </a:p>
           <a:p>
             <a:r>
-              <a:rPr lang="en-US" dirty="0" smtClean="0"/>
+              <a:rPr lang="en-US" sz="3600" dirty="0" smtClean="0"/>
               <a:t>Trial D = 270</a:t>
             </a:r>
             <a:r>
-              <a:rPr lang="en-US" baseline="30000" dirty="0" smtClean="0"/>
+              <a:rPr lang="en-US" sz="3600" baseline="30000" dirty="0" smtClean="0"/>
               <a:t>o</a:t>
             </a:r>
-            <a:endParaRPr lang="en-US" baseline="30000" dirty="0"/>
+            <a:endParaRPr lang="en-US" sz="3600" baseline="30000" dirty="0"/>
           </a:p>
         </p:txBody>
       </p:sp>
@@ -9100,8 +8974,8 @@
         </p:nvSpPr>
         <p:spPr>
           <a:xfrm>
-            <a:off x="20771393" y="24774638"/>
-            <a:ext cx="4577075" cy="5509200"/>
+            <a:off x="21679946" y="24593206"/>
+            <a:ext cx="3668522" cy="4524316"/>
           </a:xfrm>
           <a:prstGeom prst="rect">
             <a:avLst/>
@@ -9115,21 +8989,21 @@
           <a:lstStyle/>
           <a:p>
             <a:r>
-              <a:rPr lang="en-US" dirty="0" smtClean="0"/>
+              <a:rPr lang="en-US" sz="3600" dirty="0" smtClean="0"/>
               <a:t>Graph 2:</a:t>
             </a:r>
           </a:p>
           <a:p>
             <a:r>
-              <a:rPr lang="en-US" dirty="0" smtClean="0"/>
+              <a:rPr lang="en-US" sz="3600" dirty="0" smtClean="0"/>
               <a:t>Comparison of each rotation to the 0</a:t>
             </a:r>
             <a:r>
-              <a:rPr lang="en-US" baseline="30000" dirty="0" smtClean="0"/>
+              <a:rPr lang="en-US" sz="3600" baseline="30000" dirty="0" smtClean="0"/>
               <a:t>o</a:t>
             </a:r>
             <a:r>
-              <a:rPr lang="en-US" dirty="0" smtClean="0"/>
+              <a:rPr lang="en-US" sz="3600" dirty="0" smtClean="0"/>
               <a:t> trial. Positive values refer to a greater number of times seen.</a:t>
             </a:r>
           </a:p>
@@ -9144,7 +9018,7 @@
         <p:spPr>
           <a:xfrm>
             <a:off x="26138360" y="12208696"/>
-            <a:ext cx="11840104" cy="1446550"/>
+            <a:ext cx="11840104" cy="1200329"/>
           </a:xfrm>
           <a:prstGeom prst="rect">
             <a:avLst/>
@@ -9158,7 +9032,7 @@
           <a:lstStyle/>
           <a:p>
             <a:r>
-              <a:rPr lang="en-US" dirty="0" smtClean="0"/>
+              <a:rPr lang="en-US" sz="3600" dirty="0" smtClean="0"/>
               <a:t>Graph 3: Outdoor distance tests with the Raspberry Pi at a height of 4 feet.</a:t>
             </a:r>
             <a:endParaRPr lang="en-US" dirty="0"/>
@@ -9174,7 +9048,7 @@
         <p:spPr>
           <a:xfrm>
             <a:off x="26126882" y="20227095"/>
-            <a:ext cx="11840104" cy="2123658"/>
+            <a:ext cx="11840104" cy="1754327"/>
           </a:xfrm>
           <a:prstGeom prst="rect">
             <a:avLst/>
@@ -9188,10 +9062,10 @@
           <a:lstStyle/>
           <a:p>
             <a:r>
-              <a:rPr lang="en-US" dirty="0" smtClean="0"/>
+              <a:rPr lang="en-US" sz="3600" dirty="0" smtClean="0"/>
               <a:t>Graph 4: Outdoor motion trials with the Raspberry Pi on the ground and the iPhone 5 at waist height, at three different speeds.</a:t>
             </a:r>
-            <a:endParaRPr lang="en-US" dirty="0"/>
+            <a:endParaRPr lang="en-US" sz="3600" dirty="0"/>
           </a:p>
         </p:txBody>
       </p:sp>
@@ -9204,7 +9078,7 @@
           <p:nvPr/>
         </p:nvPicPr>
         <p:blipFill>
-          <a:blip r:embed="rId7">
+          <a:blip r:embed="rId6">
             <a:extLst>
               <a:ext uri="{28A0092B-C50C-407E-A947-70E740481C1C}">
                 <a14:useLocalDpi xmlns:a14="http://schemas.microsoft.com/office/drawing/2010/main" val="0"/>
@@ -9234,7 +9108,7 @@
         <p:spPr>
           <a:xfrm>
             <a:off x="26138360" y="28555230"/>
-            <a:ext cx="11840104" cy="2123658"/>
+            <a:ext cx="11840104" cy="1754327"/>
           </a:xfrm>
           <a:prstGeom prst="rect">
             <a:avLst/>
@@ -9248,13 +9122,133 @@
           <a:lstStyle/>
           <a:p>
             <a:r>
-              <a:rPr lang="en-US" dirty="0" smtClean="0"/>
+              <a:rPr lang="en-US" sz="3600" dirty="0" smtClean="0"/>
               <a:t>Graph 5: Indoor trials with a wall between the iPhone 5 and the Raspberry Pi, moving the iPhone 5, Raspberry Pi, and both, respectively.</a:t>
             </a:r>
-            <a:endParaRPr lang="en-US" dirty="0"/>
+            <a:endParaRPr lang="en-US" sz="3600" dirty="0"/>
           </a:p>
         </p:txBody>
       </p:sp>
+      <p:pic>
+        <p:nvPicPr>
+          <p:cNvPr id="2" name="Picture 1" descr="Bluetooth-Smart.jpg"/>
+          <p:cNvPicPr>
+            <a:picLocks noChangeAspect="1"/>
+          </p:cNvPicPr>
+          <p:nvPr/>
+        </p:nvPicPr>
+        <p:blipFill>
+          <a:blip r:embed="rId7">
+            <a:extLst>
+              <a:ext uri="{28A0092B-C50C-407E-A947-70E740481C1C}">
+                <a14:useLocalDpi xmlns:a14="http://schemas.microsoft.com/office/drawing/2010/main" val="0"/>
+              </a:ext>
+            </a:extLst>
+          </a:blip>
+          <a:stretch>
+            <a:fillRect/>
+          </a:stretch>
+        </p:blipFill>
+        <p:spPr>
+          <a:xfrm>
+            <a:off x="3145729" y="27471657"/>
+            <a:ext cx="8855096" cy="2781976"/>
+          </a:xfrm>
+          <a:prstGeom prst="rect">
+            <a:avLst/>
+          </a:prstGeom>
+        </p:spPr>
+      </p:pic>
+      <p:pic>
+        <p:nvPicPr>
+          <p:cNvPr id="4" name="Picture 3" descr="wearables.jpg"/>
+          <p:cNvPicPr>
+            <a:picLocks noChangeAspect="1"/>
+          </p:cNvPicPr>
+          <p:nvPr/>
+        </p:nvPicPr>
+        <p:blipFill>
+          <a:blip r:embed="rId8">
+            <a:extLst>
+              <a:ext uri="{28A0092B-C50C-407E-A947-70E740481C1C}">
+                <a14:useLocalDpi xmlns:a14="http://schemas.microsoft.com/office/drawing/2010/main" val="0"/>
+              </a:ext>
+            </a:extLst>
+          </a:blip>
+          <a:stretch>
+            <a:fillRect/>
+          </a:stretch>
+        </p:blipFill>
+        <p:spPr>
+          <a:xfrm>
+            <a:off x="3265596" y="11691460"/>
+            <a:ext cx="8748317" cy="6147466"/>
+          </a:xfrm>
+          <a:prstGeom prst="rect">
+            <a:avLst/>
+          </a:prstGeom>
+        </p:spPr>
+      </p:pic>
+      <p:pic>
+        <p:nvPicPr>
+          <p:cNvPr id="11" name="Picture 10" descr="RaspberryPi.jpg"/>
+          <p:cNvPicPr>
+            <a:picLocks noChangeAspect="1"/>
+          </p:cNvPicPr>
+          <p:nvPr/>
+        </p:nvPicPr>
+        <p:blipFill>
+          <a:blip r:embed="rId9">
+            <a:extLst>
+              <a:ext uri="{28A0092B-C50C-407E-A947-70E740481C1C}">
+                <a14:useLocalDpi xmlns:a14="http://schemas.microsoft.com/office/drawing/2010/main" val="0"/>
+              </a:ext>
+            </a:extLst>
+          </a:blip>
+          <a:stretch>
+            <a:fillRect/>
+          </a:stretch>
+        </p:blipFill>
+        <p:spPr>
+          <a:xfrm>
+            <a:off x="39096468" y="27203761"/>
+            <a:ext cx="4847527" cy="3231301"/>
+          </a:xfrm>
+          <a:prstGeom prst="rect">
+            <a:avLst/>
+          </a:prstGeom>
+        </p:spPr>
+      </p:pic>
+      <p:pic>
+        <p:nvPicPr>
+          <p:cNvPr id="15" name="Picture 14" descr="apple-iphone5-25.jpg"/>
+          <p:cNvPicPr>
+            <a:picLocks noChangeAspect="1"/>
+          </p:cNvPicPr>
+          <p:nvPr/>
+        </p:nvPicPr>
+        <p:blipFill>
+          <a:blip r:embed="rId10">
+            <a:extLst>
+              <a:ext uri="{28A0092B-C50C-407E-A947-70E740481C1C}">
+                <a14:useLocalDpi xmlns:a14="http://schemas.microsoft.com/office/drawing/2010/main" val="0"/>
+              </a:ext>
+            </a:extLst>
+          </a:blip>
+          <a:stretch>
+            <a:fillRect/>
+          </a:stretch>
+        </p:blipFill>
+        <p:spPr>
+          <a:xfrm>
+            <a:off x="44539135" y="27196339"/>
+            <a:ext cx="3790232" cy="3238723"/>
+          </a:xfrm>
+          <a:prstGeom prst="rect">
+            <a:avLst/>
+          </a:prstGeom>
+        </p:spPr>
+      </p:pic>
     </p:spTree>
   </p:cSld>
   <p:clrMapOvr>

</xml_diff>

<commit_message>
Updated (but not completed) board snapshot
</commit_message>
<xml_diff>
--- a/writeup/Board Snapshot.pptx
+++ b/writeup/Board Snapshot.pptx
@@ -146,15 +146,19 @@
 <file path=ppt/commentAuthors.xml><?xml version="1.0" encoding="utf-8"?>
 <p:cmAuthorLst xmlns:a="http://schemas.openxmlformats.org/drawingml/2006/main" xmlns:r="http://schemas.openxmlformats.org/officeDocument/2006/relationships" xmlns:p="http://schemas.openxmlformats.org/presentationml/2006/main">
   <p:cmAuthor id="0" name="Jeff Squyres" initials="JS" lastIdx="9" clrIdx="0"/>
+  <p:cmAuthor id="1" name="Larry Howe-Kerr" initials="" lastIdx="2" clrIdx="1"/>
 </p:cmAuthorLst>
 </file>
 
 <file path=ppt/comments/comment1.xml><?xml version="1.0" encoding="utf-8"?>
 <p:cmLst xmlns:a="http://schemas.openxmlformats.org/drawingml/2006/main" xmlns:r="http://schemas.openxmlformats.org/officeDocument/2006/relationships" xmlns:p="http://schemas.openxmlformats.org/presentationml/2006/main">
-  <p:cm authorId="0" dt="2014-01-26T18:46:19.140" idx="4">
-    <p:pos x="10494" y="13506"/>
-    <p:text>Picture = 1000 words here (e.g., for the 4 orientations)
-</p:text>
+  <p:cm authorId="1" dt="2014-02-22T09:23:51.772" idx="1">
+    <p:pos x="14249" y="11370"/>
+    <p:text>Place all captions in the graphs using excel to include Graph 1, etc.</p:text>
+  </p:cm>
+  <p:cm authorId="1" dt="2014-02-22T09:25:07.863" idx="2">
+    <p:pos x="2143" y="7396"/>
+    <p:text>Remove or shrink - replace with a few smaller pics</p:text>
   </p:cm>
 </p:cmLst>
 </file>
@@ -1561,7 +1565,7 @@
             <a:fld id="{BDA5651B-C405-A149-B22A-CA338DFD0D46}" type="datetime1">
               <a:rPr lang="en-US"/>
               <a:pPr/>
-              <a:t>1/26/14</a:t>
+              <a:t>2/22/14</a:t>
             </a:fld>
             <a:endParaRPr lang="en-US"/>
           </a:p>
@@ -2133,7 +2137,7 @@
             <a:fld id="{4C0CB2A7-298B-0346-9691-9743C8FCC14F}" type="datetime1">
               <a:rPr lang="en-US"/>
               <a:pPr/>
-              <a:t>1/26/14</a:t>
+              <a:t>2/22/14</a:t>
             </a:fld>
             <a:endParaRPr lang="en-US"/>
           </a:p>
@@ -2339,7 +2343,7 @@
             <a:fld id="{FC7DC0D9-3080-6348-9E83-AA7D17CED573}" type="datetime1">
               <a:rPr lang="en-US"/>
               <a:pPr/>
-              <a:t>1/26/14</a:t>
+              <a:t>2/22/14</a:t>
             </a:fld>
             <a:endParaRPr lang="en-US"/>
           </a:p>
@@ -2535,7 +2539,7 @@
             <a:fld id="{BF013981-7038-D14E-B481-885CFE012C4D}" type="datetime1">
               <a:rPr lang="en-US"/>
               <a:pPr/>
-              <a:t>1/26/14</a:t>
+              <a:t>2/22/14</a:t>
             </a:fld>
             <a:endParaRPr lang="en-US"/>
           </a:p>
@@ -2753,7 +2757,7 @@
             <a:fld id="{D470504F-A014-0649-82C6-EE739CECA6DB}" type="datetime1">
               <a:rPr lang="en-US"/>
               <a:pPr/>
-              <a:t>1/26/14</a:t>
+              <a:t>2/22/14</a:t>
             </a:fld>
             <a:endParaRPr lang="en-US"/>
           </a:p>
@@ -3067,7 +3071,7 @@
             <a:fld id="{10AFF9DE-996D-6E4C-AE92-904B846DA7DE}" type="datetime1">
               <a:rPr lang="en-US"/>
               <a:pPr/>
-              <a:t>1/26/14</a:t>
+              <a:t>2/22/14</a:t>
             </a:fld>
             <a:endParaRPr lang="en-US"/>
           </a:p>
@@ -3520,7 +3524,7 @@
             <a:fld id="{C5D4D892-8179-8947-A7BD-0F0304791D71}" type="datetime1">
               <a:rPr lang="en-US"/>
               <a:pPr/>
-              <a:t>1/26/14</a:t>
+              <a:t>2/22/14</a:t>
             </a:fld>
             <a:endParaRPr lang="en-US"/>
           </a:p>
@@ -3664,7 +3668,7 @@
             <a:fld id="{65FB1D16-1BB6-6D45-BD68-0698BE537699}" type="datetime1">
               <a:rPr lang="en-US"/>
               <a:pPr/>
-              <a:t>1/26/14</a:t>
+              <a:t>2/22/14</a:t>
             </a:fld>
             <a:endParaRPr lang="en-US"/>
           </a:p>
@@ -3785,7 +3789,7 @@
             <a:fld id="{6574763F-ABE3-6A47-9EC3-D2E3DB9DD054}" type="datetime1">
               <a:rPr lang="en-US"/>
               <a:pPr/>
-              <a:t>1/26/14</a:t>
+              <a:t>2/22/14</a:t>
             </a:fld>
             <a:endParaRPr lang="en-US"/>
           </a:p>
@@ -4088,7 +4092,7 @@
             <a:fld id="{9AC780A8-A81A-4D47-8961-A08D004F5898}" type="datetime1">
               <a:rPr lang="en-US"/>
               <a:pPr/>
-              <a:t>1/26/14</a:t>
+              <a:t>2/22/14</a:t>
             </a:fld>
             <a:endParaRPr lang="en-US"/>
           </a:p>
@@ -4368,7 +4372,7 @@
             <a:fld id="{1BB05508-BBA8-7A43-8481-D94387CAC796}" type="datetime1">
               <a:rPr lang="en-US"/>
               <a:pPr/>
-              <a:t>1/26/14</a:t>
+              <a:t>2/22/14</a:t>
             </a:fld>
             <a:endParaRPr lang="en-US"/>
           </a:p>
@@ -5243,7 +5247,7 @@
             <a:fld id="{9FC0DD12-D298-C645-BD79-BE38BB9577FA}" type="datetime1">
               <a:rPr lang="en-US"/>
               <a:pPr/>
-              <a:t>1/26/14</a:t>
+              <a:t>2/22/14</a:t>
             </a:fld>
             <a:endParaRPr lang="en-US"/>
           </a:p>
@@ -6152,8 +6156,8 @@
         </p:nvSpPr>
         <p:spPr bwMode="auto">
           <a:xfrm>
-            <a:off x="9601200" y="1968500"/>
-            <a:ext cx="32518350" cy="2308324"/>
+            <a:off x="9558868" y="2561147"/>
+            <a:ext cx="32518350" cy="1200329"/>
           </a:xfrm>
           <a:prstGeom prst="rect">
             <a:avLst/>
@@ -6306,12 +6310,49 @@
             <a:pPr algn="ctr" eaLnBrk="1" hangingPunct="1"/>
             <a:r>
               <a:rPr lang="en-US" sz="7200" dirty="0" smtClean="0"/>
-              <a:t>Determining the Practical Range of Bluetooth Low Energy on an iPhone and a Raspberry Pi</a:t>
+              <a:t>Determining the Practical </a:t>
+            </a:r>
+            <a:r>
+              <a:rPr lang="en-US" sz="7200" dirty="0" smtClean="0"/>
+              <a:t>Range of </a:t>
+            </a:r>
+            <a:r>
+              <a:rPr lang="en-US" sz="7200" dirty="0" smtClean="0"/>
+              <a:t>an iPhone’s Bluetooth LE Transmitter</a:t>
             </a:r>
             <a:endParaRPr lang="en-US" sz="7200" dirty="0"/>
           </a:p>
         </p:txBody>
       </p:sp>
+      <p:pic>
+        <p:nvPicPr>
+          <p:cNvPr id="38" name="Picture 37" descr="Bluetooth-Smart.jpg"/>
+          <p:cNvPicPr>
+            <a:picLocks noChangeAspect="1"/>
+          </p:cNvPicPr>
+          <p:nvPr/>
+        </p:nvPicPr>
+        <p:blipFill rotWithShape="1">
+          <a:blip r:embed="rId2">
+            <a:extLst>
+              <a:ext uri="{28A0092B-C50C-407E-A947-70E740481C1C}">
+                <a14:useLocalDpi xmlns:a14="http://schemas.microsoft.com/office/drawing/2010/main" val="0"/>
+              </a:ext>
+            </a:extLst>
+          </a:blip>
+          <a:srcRect r="79879" b="17158"/>
+          <a:stretch/>
+        </p:blipFill>
+        <p:spPr>
+          <a:xfrm>
+            <a:off x="16759850" y="5696095"/>
+            <a:ext cx="19307404" cy="24973408"/>
+          </a:xfrm>
+          <a:prstGeom prst="rect">
+            <a:avLst/>
+          </a:prstGeom>
+        </p:spPr>
+      </p:pic>
       <p:sp>
         <p:nvSpPr>
           <p:cNvPr id="3084" name="Text Box 146"/>
@@ -8365,23 +8406,7 @@
             </a:r>
             <a:r>
               <a:rPr lang="en-US" sz="3600" dirty="0" smtClean="0"/>
-              <a:t>first step in determining the practical range was to establish a baseline and determine whether the direction of the Bluetooth nub mattered</a:t>
-            </a:r>
-            <a:r>
-              <a:rPr lang="en-US" sz="3600" dirty="0" smtClean="0"/>
-              <a:t>. These </a:t>
-            </a:r>
-            <a:r>
-              <a:rPr lang="en-US" sz="3600" dirty="0" smtClean="0"/>
-              <a:t>two were tested </a:t>
-            </a:r>
-            <a:r>
-              <a:rPr lang="en-US" sz="3600" dirty="0" smtClean="0"/>
-              <a:t>in ideal conditions. </a:t>
-            </a:r>
-            <a:r>
-              <a:rPr lang="en-US" sz="3600" dirty="0" smtClean="0"/>
-              <a:t>Then the Raspberry Pi was raised to a height of 4 feet, and the experiments were repeated using the ideal </a:t>
+              <a:t>first step in determining the practical range was to establish a baseline and determine whether the direction of the Bluetooth nub mattered. These two were tested in ideal conditions. Then the Raspberry Pi was raised to a height of 4 feet, and the experiments were repeated using the ideal </a:t>
             </a:r>
             <a:r>
               <a:rPr lang="en-US" sz="3600" dirty="0" err="1" smtClean="0"/>
@@ -8389,15 +8414,7 @@
             </a:r>
             <a:r>
               <a:rPr lang="en-US" sz="3600" dirty="0" smtClean="0"/>
-              <a:t> of the nub. Placing the Raspberry Pi back on the ground, motion tests were performed by moving in a straight line with the closest point being the measurement. Lastly, the first test was repeated </a:t>
-            </a:r>
-            <a:r>
-              <a:rPr lang="en-US" sz="3600" dirty="0" smtClean="0"/>
-              <a:t>in practical conditions, with a wall between the devices. </a:t>
-            </a:r>
-            <a:r>
-              <a:rPr lang="en-US" sz="3600" dirty="0" smtClean="0"/>
-              <a:t>It was tested moving each device away from the wall as well as moving both devices.</a:t>
+              <a:t> of the nub. Placing the Raspberry Pi back on the ground, motion tests were performed by moving in a straight line with the closest point being the measurement. Lastly, the first test was repeated in practical conditions, with a wall between the devices. It was tested moving each device away from the wall as well as moving both devices.</a:t>
             </a:r>
             <a:endParaRPr lang="en-US" sz="3600" dirty="0"/>
           </a:p>
@@ -8575,7 +8592,23 @@
             </a:r>
             <a:r>
               <a:rPr lang="en-US" sz="3600" dirty="0" smtClean="0"/>
-              <a:t> was ideal. Although 0o was the strongest, 180o turned out to be most consistent over the longest distance, making it the ideal orientation.</a:t>
+              <a:t> was ideal. Although 0</a:t>
+            </a:r>
+            <a:r>
+              <a:rPr lang="en-US" sz="3600" baseline="30000" dirty="0" smtClean="0"/>
+              <a:t>o</a:t>
+            </a:r>
+            <a:r>
+              <a:rPr lang="en-US" sz="3600" dirty="0" smtClean="0"/>
+              <a:t> was the strongest, 180</a:t>
+            </a:r>
+            <a:r>
+              <a:rPr lang="en-US" sz="3600" baseline="30000" dirty="0" smtClean="0"/>
+              <a:t>o</a:t>
+            </a:r>
+            <a:r>
+              <a:rPr lang="en-US" sz="3600" dirty="0" smtClean="0"/>
+              <a:t> turned out to be most consistent over the longest distance, making it the ideal orientation.</a:t>
             </a:r>
           </a:p>
           <a:p>
@@ -8663,7 +8696,7 @@
         <p:spPr>
           <a:xfrm>
             <a:off x="39125603" y="19646772"/>
-            <a:ext cx="9422920" cy="6740308"/>
+            <a:ext cx="9422920" cy="6186310"/>
           </a:xfrm>
           <a:prstGeom prst="rect">
             <a:avLst/>
@@ -8695,15 +8728,7 @@
             </a:r>
             <a:r>
               <a:rPr lang="en-US" sz="3600" dirty="0" smtClean="0"/>
-              <a:t>he </a:t>
-            </a:r>
-            <a:r>
-              <a:rPr lang="en-US" sz="3600" dirty="0" smtClean="0"/>
-              <a:t>ideal indoor setup consisted </a:t>
-            </a:r>
-            <a:r>
-              <a:rPr lang="en-US" sz="3600" dirty="0" smtClean="0"/>
-              <a:t>of:</a:t>
+              <a:t>he ideal indoor setup consisted of:</a:t>
             </a:r>
           </a:p>
           <a:p>
@@ -8713,16 +8738,13 @@
             </a:pPr>
             <a:r>
               <a:rPr lang="en-US" sz="3600" dirty="0" smtClean="0"/>
-              <a:t>placing </a:t>
+              <a:t>placing the Raspberry Pi at a height of </a:t>
             </a:r>
             <a:r>
               <a:rPr lang="en-US" sz="3600" dirty="0" smtClean="0"/>
-              <a:t>the Raspberry Pi at a height of 4 </a:t>
-            </a:r>
-            <a:r>
-              <a:rPr lang="en-US" sz="3600" dirty="0" smtClean="0"/>
-              <a:t>feet</a:t>
-            </a:r>
+              <a:t>4”</a:t>
+            </a:r>
+            <a:endParaRPr lang="en-US" sz="3600" dirty="0" smtClean="0"/>
           </a:p>
           <a:p>
             <a:pPr marL="571500" indent="-571500">
@@ -8731,13 +8753,8 @@
             </a:pPr>
             <a:r>
               <a:rPr lang="en-US" sz="3600" dirty="0" smtClean="0"/>
-              <a:t>away </a:t>
-            </a:r>
-            <a:r>
-              <a:rPr lang="en-US" sz="3600" dirty="0" smtClean="0"/>
-              <a:t>from a wall </a:t>
-            </a:r>
-            <a:endParaRPr lang="en-US" sz="3600" dirty="0" smtClean="0"/>
+              <a:t>away from a wall </a:t>
+            </a:r>
           </a:p>
           <a:p>
             <a:pPr marL="571500" indent="-571500">
@@ -8746,15 +8763,7 @@
             </a:pPr>
             <a:r>
               <a:rPr lang="en-US" sz="3600" dirty="0" smtClean="0"/>
-              <a:t>with </a:t>
-            </a:r>
-            <a:r>
-              <a:rPr lang="en-US" sz="3600" dirty="0" smtClean="0"/>
-              <a:t>the Bluetooth nub facing away from the general location of the </a:t>
-            </a:r>
-            <a:r>
-              <a:rPr lang="en-US" sz="3600" dirty="0" smtClean="0"/>
-              <a:t>iPhone</a:t>
+              <a:t>with the Bluetooth nub facing away from the general location of the iPhone</a:t>
             </a:r>
           </a:p>
           <a:p>
@@ -8764,7 +8773,19 @@
             </a:pPr>
             <a:r>
               <a:rPr lang="en-US" sz="3600" dirty="0" smtClean="0"/>
-              <a:t>Its range exceeds 80 feet</a:t>
+              <a:t>a </a:t>
+            </a:r>
+            <a:r>
+              <a:rPr lang="en-US" sz="3600" dirty="0" smtClean="0"/>
+              <a:t>range </a:t>
+            </a:r>
+            <a:r>
+              <a:rPr lang="en-US" sz="3600" dirty="0" smtClean="0"/>
+              <a:t>not exceeding 30 </a:t>
+            </a:r>
+            <a:r>
+              <a:rPr lang="en-US" sz="3600" dirty="0" smtClean="0"/>
+              <a:t>feet</a:t>
             </a:r>
             <a:endParaRPr lang="en-US" sz="3600" dirty="0"/>
           </a:p>
@@ -8779,7 +8800,7 @@
           <p:nvPr/>
         </p:nvPicPr>
         <p:blipFill>
-          <a:blip r:embed="rId2">
+          <a:blip r:embed="rId3">
             <a:extLst>
               <a:ext uri="{28A0092B-C50C-407E-A947-70E740481C1C}">
                 <a14:useLocalDpi xmlns:a14="http://schemas.microsoft.com/office/drawing/2010/main" val="0"/>
@@ -8792,7 +8813,7 @@
         </p:blipFill>
         <p:spPr>
           <a:xfrm>
-            <a:off x="16241528" y="15920571"/>
+            <a:off x="16114531" y="15158595"/>
             <a:ext cx="9045249" cy="7412617"/>
           </a:xfrm>
           <a:prstGeom prst="rect">
@@ -8809,7 +8830,7 @@
           <p:nvPr/>
         </p:nvPicPr>
         <p:blipFill>
-          <a:blip r:embed="rId3">
+          <a:blip r:embed="rId4">
             <a:extLst>
               <a:ext uri="{28A0092B-C50C-407E-A947-70E740481C1C}">
                 <a14:useLocalDpi xmlns:a14="http://schemas.microsoft.com/office/drawing/2010/main" val="0"/>
@@ -8839,7 +8860,7 @@
           <p:nvPr/>
         </p:nvPicPr>
         <p:blipFill>
-          <a:blip r:embed="rId4">
+          <a:blip r:embed="rId5">
             <a:extLst>
               <a:ext uri="{28A0092B-C50C-407E-A947-70E740481C1C}">
                 <a14:useLocalDpi xmlns:a14="http://schemas.microsoft.com/office/drawing/2010/main" val="0"/>
@@ -8869,7 +8890,7 @@
           <p:nvPr/>
         </p:nvPicPr>
         <p:blipFill>
-          <a:blip r:embed="rId5">
+          <a:blip r:embed="rId6">
             <a:extLst>
               <a:ext uri="{28A0092B-C50C-407E-A947-70E740481C1C}">
                 <a14:useLocalDpi xmlns:a14="http://schemas.microsoft.com/office/drawing/2010/main" val="0"/>
@@ -9078,7 +9099,7 @@
           <p:nvPr/>
         </p:nvPicPr>
         <p:blipFill>
-          <a:blip r:embed="rId6">
+          <a:blip r:embed="rId7">
             <a:extLst>
               <a:ext uri="{28A0092B-C50C-407E-A947-70E740481C1C}">
                 <a14:useLocalDpi xmlns:a14="http://schemas.microsoft.com/office/drawing/2010/main" val="0"/>
@@ -9138,7 +9159,7 @@
           <p:nvPr/>
         </p:nvPicPr>
         <p:blipFill>
-          <a:blip r:embed="rId7">
+          <a:blip r:embed="rId2">
             <a:extLst>
               <a:ext uri="{28A0092B-C50C-407E-A947-70E740481C1C}">
                 <a14:useLocalDpi xmlns:a14="http://schemas.microsoft.com/office/drawing/2010/main" val="0"/>
@@ -9183,66 +9204,6 @@
           <a:xfrm>
             <a:off x="3265596" y="11691460"/>
             <a:ext cx="8748317" cy="6147466"/>
-          </a:xfrm>
-          <a:prstGeom prst="rect">
-            <a:avLst/>
-          </a:prstGeom>
-        </p:spPr>
-      </p:pic>
-      <p:pic>
-        <p:nvPicPr>
-          <p:cNvPr id="11" name="Picture 10" descr="RaspberryPi.jpg"/>
-          <p:cNvPicPr>
-            <a:picLocks noChangeAspect="1"/>
-          </p:cNvPicPr>
-          <p:nvPr/>
-        </p:nvPicPr>
-        <p:blipFill>
-          <a:blip r:embed="rId9">
-            <a:extLst>
-              <a:ext uri="{28A0092B-C50C-407E-A947-70E740481C1C}">
-                <a14:useLocalDpi xmlns:a14="http://schemas.microsoft.com/office/drawing/2010/main" val="0"/>
-              </a:ext>
-            </a:extLst>
-          </a:blip>
-          <a:stretch>
-            <a:fillRect/>
-          </a:stretch>
-        </p:blipFill>
-        <p:spPr>
-          <a:xfrm>
-            <a:off x="39096468" y="27203761"/>
-            <a:ext cx="4847527" cy="3231301"/>
-          </a:xfrm>
-          <a:prstGeom prst="rect">
-            <a:avLst/>
-          </a:prstGeom>
-        </p:spPr>
-      </p:pic>
-      <p:pic>
-        <p:nvPicPr>
-          <p:cNvPr id="15" name="Picture 14" descr="apple-iphone5-25.jpg"/>
-          <p:cNvPicPr>
-            <a:picLocks noChangeAspect="1"/>
-          </p:cNvPicPr>
-          <p:nvPr/>
-        </p:nvPicPr>
-        <p:blipFill>
-          <a:blip r:embed="rId10">
-            <a:extLst>
-              <a:ext uri="{28A0092B-C50C-407E-A947-70E740481C1C}">
-                <a14:useLocalDpi xmlns:a14="http://schemas.microsoft.com/office/drawing/2010/main" val="0"/>
-              </a:ext>
-            </a:extLst>
-          </a:blip>
-          <a:stretch>
-            <a:fillRect/>
-          </a:stretch>
-        </p:blipFill>
-        <p:spPr>
-          <a:xfrm>
-            <a:off x="44539135" y="27196339"/>
-            <a:ext cx="3790232" cy="3238723"/>
           </a:xfrm>
           <a:prstGeom prst="rect">
             <a:avLst/>

</xml_diff>